<commit_message>
Update tasks list find diagrams
</commit_message>
<xml_diff>
--- a/docs/diagrams/TaskListFindSequenceDiagram.pptx
+++ b/docs/diagrams/TaskListFindSequenceDiagram.pptx
@@ -210,7 +210,7 @@
           <a:p>
             <a:fld id="{F5CC4B3F-88C1-4FFA-B1B6-F41C21DC6924}" type="datetimeFigureOut">
               <a:rPr lang="en-US" smtClean="0"/>
-              <a:t>10/17/2018</a:t>
+              <a:t>11/11/2018</a:t>
             </a:fld>
             <a:endParaRPr lang="en-US"/>
           </a:p>
@@ -824,7 +824,7 @@
           <a:p>
             <a:fld id="{78C97017-6FC3-485B-9764-EAC9E56C1D49}" type="datetimeFigureOut">
               <a:rPr lang="en-US" smtClean="0"/>
-              <a:t>10/17/2018</a:t>
+              <a:t>11/11/2018</a:t>
             </a:fld>
             <a:endParaRPr lang="en-US"/>
           </a:p>
@@ -992,7 +992,7 @@
           <a:p>
             <a:fld id="{78C97017-6FC3-485B-9764-EAC9E56C1D49}" type="datetimeFigureOut">
               <a:rPr lang="en-US" smtClean="0"/>
-              <a:t>10/17/2018</a:t>
+              <a:t>11/11/2018</a:t>
             </a:fld>
             <a:endParaRPr lang="en-US"/>
           </a:p>
@@ -1170,7 +1170,7 @@
           <a:p>
             <a:fld id="{78C97017-6FC3-485B-9764-EAC9E56C1D49}" type="datetimeFigureOut">
               <a:rPr lang="en-US" smtClean="0"/>
-              <a:t>10/17/2018</a:t>
+              <a:t>11/11/2018</a:t>
             </a:fld>
             <a:endParaRPr lang="en-US"/>
           </a:p>
@@ -1338,7 +1338,7 @@
           <a:p>
             <a:fld id="{78C97017-6FC3-485B-9764-EAC9E56C1D49}" type="datetimeFigureOut">
               <a:rPr lang="en-US" smtClean="0"/>
-              <a:t>10/17/2018</a:t>
+              <a:t>11/11/2018</a:t>
             </a:fld>
             <a:endParaRPr lang="en-US"/>
           </a:p>
@@ -1583,7 +1583,7 @@
           <a:p>
             <a:fld id="{78C97017-6FC3-485B-9764-EAC9E56C1D49}" type="datetimeFigureOut">
               <a:rPr lang="en-US" smtClean="0"/>
-              <a:t>10/17/2018</a:t>
+              <a:t>11/11/2018</a:t>
             </a:fld>
             <a:endParaRPr lang="en-US"/>
           </a:p>
@@ -1868,7 +1868,7 @@
           <a:p>
             <a:fld id="{78C97017-6FC3-485B-9764-EAC9E56C1D49}" type="datetimeFigureOut">
               <a:rPr lang="en-US" smtClean="0"/>
-              <a:t>10/17/2018</a:t>
+              <a:t>11/11/2018</a:t>
             </a:fld>
             <a:endParaRPr lang="en-US"/>
           </a:p>
@@ -2287,7 +2287,7 @@
           <a:p>
             <a:fld id="{78C97017-6FC3-485B-9764-EAC9E56C1D49}" type="datetimeFigureOut">
               <a:rPr lang="en-US" smtClean="0"/>
-              <a:t>10/17/2018</a:t>
+              <a:t>11/11/2018</a:t>
             </a:fld>
             <a:endParaRPr lang="en-US"/>
           </a:p>
@@ -2404,7 +2404,7 @@
           <a:p>
             <a:fld id="{78C97017-6FC3-485B-9764-EAC9E56C1D49}" type="datetimeFigureOut">
               <a:rPr lang="en-US" smtClean="0"/>
-              <a:t>10/17/2018</a:t>
+              <a:t>11/11/2018</a:t>
             </a:fld>
             <a:endParaRPr lang="en-US"/>
           </a:p>
@@ -2499,7 +2499,7 @@
           <a:p>
             <a:fld id="{78C97017-6FC3-485B-9764-EAC9E56C1D49}" type="datetimeFigureOut">
               <a:rPr lang="en-US" smtClean="0"/>
-              <a:t>10/17/2018</a:t>
+              <a:t>11/11/2018</a:t>
             </a:fld>
             <a:endParaRPr lang="en-US"/>
           </a:p>
@@ -2774,7 +2774,7 @@
           <a:p>
             <a:fld id="{78C97017-6FC3-485B-9764-EAC9E56C1D49}" type="datetimeFigureOut">
               <a:rPr lang="en-US" smtClean="0"/>
-              <a:t>10/17/2018</a:t>
+              <a:t>11/11/2018</a:t>
             </a:fld>
             <a:endParaRPr lang="en-US"/>
           </a:p>
@@ -3026,7 +3026,7 @@
           <a:p>
             <a:fld id="{78C97017-6FC3-485B-9764-EAC9E56C1D49}" type="datetimeFigureOut">
               <a:rPr lang="en-US" smtClean="0"/>
-              <a:t>10/17/2018</a:t>
+              <a:t>11/11/2018</a:t>
             </a:fld>
             <a:endParaRPr lang="en-US"/>
           </a:p>
@@ -3237,7 +3237,7 @@
           <a:p>
             <a:fld id="{78C97017-6FC3-485B-9764-EAC9E56C1D49}" type="datetimeFigureOut">
               <a:rPr lang="en-US" smtClean="0"/>
-              <a:t>10/17/2018</a:t>
+              <a:t>11/11/2018</a:t>
             </a:fld>
             <a:endParaRPr lang="en-US"/>
           </a:p>
@@ -3614,10 +3614,10 @@
       </p:grpSpPr>
       <p:sp>
         <p:nvSpPr>
-          <p:cNvPr id="109" name="Rectangle 65">
+          <p:cNvPr id="65" name="Rectangle 65">
             <a:extLst>
               <a:ext uri="{FF2B5EF4-FFF2-40B4-BE49-F238E27FC236}">
-                <a16:creationId xmlns:a16="http://schemas.microsoft.com/office/drawing/2014/main" id="{ABAE49FB-8AD4-4A6B-A7C0-5D2EF9ECFCC5}"/>
+                <a16:creationId xmlns:a16="http://schemas.microsoft.com/office/drawing/2014/main" id="{2C918AE4-FDBA-42B5-8AA0-5FD59A17EDB2}"/>
               </a:ext>
             </a:extLst>
           </p:cNvPr>
@@ -3626,7 +3626,7 @@
         </p:nvSpPr>
         <p:spPr>
           <a:xfrm>
-            <a:off x="9118288" y="3969274"/>
+            <a:off x="9475251" y="3969275"/>
             <a:ext cx="1413844" cy="1316559"/>
           </a:xfrm>
           <a:prstGeom prst="roundRect">
@@ -3679,6 +3679,190 @@
           </a:p>
         </p:txBody>
       </p:sp>
+      <p:grpSp>
+        <p:nvGrpSpPr>
+          <p:cNvPr id="66" name="Group 65">
+            <a:extLst>
+              <a:ext uri="{FF2B5EF4-FFF2-40B4-BE49-F238E27FC236}">
+                <a16:creationId xmlns:a16="http://schemas.microsoft.com/office/drawing/2014/main" id="{E0D5C177-57F4-4857-B05B-1C11BDFB49CB}"/>
+              </a:ext>
+            </a:extLst>
+          </p:cNvPr>
+          <p:cNvGrpSpPr/>
+          <p:nvPr/>
+        </p:nvGrpSpPr>
+        <p:grpSpPr>
+          <a:xfrm>
+            <a:off x="9574042" y="4202254"/>
+            <a:ext cx="1316989" cy="2350946"/>
+            <a:chOff x="2077469" y="2067400"/>
+            <a:chExt cx="2202424" cy="3931525"/>
+          </a:xfrm>
+        </p:grpSpPr>
+        <p:sp>
+          <p:nvSpPr>
+            <p:cNvPr id="69" name="Rectangle 62">
+              <a:extLst>
+                <a:ext uri="{FF2B5EF4-FFF2-40B4-BE49-F238E27FC236}">
+                  <a16:creationId xmlns:a16="http://schemas.microsoft.com/office/drawing/2014/main" id="{B2E481D1-A040-4077-8CC2-0A5F53125D24}"/>
+                </a:ext>
+              </a:extLst>
+            </p:cNvPr>
+            <p:cNvSpPr/>
+            <p:nvPr/>
+          </p:nvSpPr>
+          <p:spPr>
+            <a:xfrm>
+              <a:off x="2077469" y="2067400"/>
+              <a:ext cx="2202424" cy="474704"/>
+            </a:xfrm>
+            <a:prstGeom prst="rect">
+              <a:avLst/>
+            </a:prstGeom>
+            <a:solidFill>
+              <a:srgbClr val="7030A0"/>
+            </a:solidFill>
+            <a:ln w="19050">
+              <a:solidFill>
+                <a:srgbClr val="7030A0"/>
+              </a:solidFill>
+            </a:ln>
+            <a:effectLst/>
+          </p:spPr>
+          <p:style>
+            <a:lnRef idx="1">
+              <a:schemeClr val="accent2"/>
+            </a:lnRef>
+            <a:fillRef idx="2">
+              <a:schemeClr val="accent2"/>
+            </a:fillRef>
+            <a:effectRef idx="1">
+              <a:schemeClr val="accent2"/>
+            </a:effectRef>
+            <a:fontRef idx="minor">
+              <a:schemeClr val="dk1"/>
+            </a:fontRef>
+          </p:style>
+          <p:txBody>
+            <a:bodyPr rtlCol="0" anchor="ctr"/>
+            <a:lstStyle/>
+            <a:p>
+              <a:pPr algn="ctr"/>
+              <a:r>
+                <a:rPr lang="en-US" sz="1400" dirty="0">
+                  <a:solidFill>
+                    <a:schemeClr val="bg1"/>
+                  </a:solidFill>
+                </a:rPr>
+                <a:t>model: Model</a:t>
+              </a:r>
+              <a:endParaRPr lang="en-SG" sz="1400" dirty="0">
+                <a:solidFill>
+                  <a:schemeClr val="bg1"/>
+                </a:solidFill>
+              </a:endParaRPr>
+            </a:p>
+          </p:txBody>
+        </p:sp>
+        <p:cxnSp>
+          <p:nvCxnSpPr>
+            <p:cNvPr id="74" name="Straight Connector 73">
+              <a:extLst>
+                <a:ext uri="{FF2B5EF4-FFF2-40B4-BE49-F238E27FC236}">
+                  <a16:creationId xmlns:a16="http://schemas.microsoft.com/office/drawing/2014/main" id="{27949923-5D7E-4306-8844-850005AD719A}"/>
+                </a:ext>
+              </a:extLst>
+            </p:cNvPr>
+            <p:cNvCxnSpPr>
+              <a:cxnSpLocks/>
+            </p:cNvCxnSpPr>
+            <p:nvPr/>
+          </p:nvCxnSpPr>
+          <p:spPr>
+            <a:xfrm>
+              <a:off x="3108893" y="2542104"/>
+              <a:ext cx="0" cy="3456821"/>
+            </a:xfrm>
+            <a:prstGeom prst="line">
+              <a:avLst/>
+            </a:prstGeom>
+            <a:ln w="19050">
+              <a:solidFill>
+                <a:srgbClr val="7030A0"/>
+              </a:solidFill>
+              <a:prstDash val="sysDash"/>
+            </a:ln>
+            <a:effectLst/>
+          </p:spPr>
+          <p:style>
+            <a:lnRef idx="1">
+              <a:schemeClr val="accent1"/>
+            </a:lnRef>
+            <a:fillRef idx="2">
+              <a:schemeClr val="accent1"/>
+            </a:fillRef>
+            <a:effectRef idx="1">
+              <a:schemeClr val="accent1"/>
+            </a:effectRef>
+            <a:fontRef idx="minor">
+              <a:schemeClr val="dk1"/>
+            </a:fontRef>
+          </p:style>
+        </p:cxnSp>
+        <p:sp>
+          <p:nvSpPr>
+            <p:cNvPr id="78" name="Rectangle 77">
+              <a:extLst>
+                <a:ext uri="{FF2B5EF4-FFF2-40B4-BE49-F238E27FC236}">
+                  <a16:creationId xmlns:a16="http://schemas.microsoft.com/office/drawing/2014/main" id="{C25EA7A8-43C8-4E70-80B9-3AF7EF4131BF}"/>
+                </a:ext>
+              </a:extLst>
+            </p:cNvPr>
+            <p:cNvSpPr/>
+            <p:nvPr/>
+          </p:nvSpPr>
+          <p:spPr>
+            <a:xfrm>
+              <a:off x="2976798" y="2839385"/>
+              <a:ext cx="219726" cy="331420"/>
+            </a:xfrm>
+            <a:prstGeom prst="rect">
+              <a:avLst/>
+            </a:prstGeom>
+            <a:solidFill>
+              <a:srgbClr val="7030A0"/>
+            </a:solidFill>
+            <a:ln>
+              <a:solidFill>
+                <a:srgbClr val="7030A0"/>
+              </a:solidFill>
+            </a:ln>
+            <a:effectLst/>
+          </p:spPr>
+          <p:style>
+            <a:lnRef idx="1">
+              <a:schemeClr val="accent3"/>
+            </a:lnRef>
+            <a:fillRef idx="2">
+              <a:schemeClr val="accent3"/>
+            </a:fillRef>
+            <a:effectRef idx="1">
+              <a:schemeClr val="accent3"/>
+            </a:effectRef>
+            <a:fontRef idx="minor">
+              <a:schemeClr val="dk1"/>
+            </a:fontRef>
+          </p:style>
+          <p:txBody>
+            <a:bodyPr rtlCol="0" anchor="ctr"/>
+            <a:lstStyle/>
+            <a:p>
+              <a:pPr algn="ctr"/>
+              <a:endParaRPr lang="en-SG" sz="1400"/>
+            </a:p>
+          </p:txBody>
+        </p:sp>
+      </p:grpSp>
       <p:sp>
         <p:nvSpPr>
           <p:cNvPr id="25" name="Rectangle 65">
@@ -4069,7 +4253,9 @@
               </a:ext>
             </a:extLst>
           </p:cNvPr>
-          <p:cNvCxnSpPr/>
+          <p:cNvCxnSpPr>
+            <a:cxnSpLocks/>
+          </p:cNvCxnSpPr>
           <p:nvPr/>
         </p:nvCxnSpPr>
         <p:spPr>
@@ -4172,7 +4358,7 @@
         </p:nvCxnSpPr>
         <p:spPr>
           <a:xfrm flipV="1">
-            <a:off x="-121144" y="2418955"/>
+            <a:off x="-113225" y="2248062"/>
             <a:ext cx="1843843" cy="2454"/>
           </a:xfrm>
           <a:prstGeom prst="straightConnector1">
@@ -4258,7 +4444,7 @@
         </p:nvSpPr>
         <p:spPr>
           <a:xfrm>
-            <a:off x="-540153" y="2147555"/>
+            <a:off x="-524755" y="2269640"/>
             <a:ext cx="2186846" cy="215444"/>
           </a:xfrm>
           <a:prstGeom prst="rect">
@@ -5151,7 +5337,7 @@
         <p:spPr>
           <a:xfrm>
             <a:off x="3611695" y="2087553"/>
-            <a:ext cx="12247" cy="3394210"/>
+            <a:ext cx="16113" cy="4465647"/>
           </a:xfrm>
           <a:prstGeom prst="line">
             <a:avLst/>
@@ -5345,7 +5531,7 @@
         </p:nvCxnSpPr>
         <p:spPr>
           <a:xfrm>
-            <a:off x="1884845" y="2404127"/>
+            <a:off x="1884845" y="2393396"/>
             <a:ext cx="1623212" cy="0"/>
           </a:xfrm>
           <a:prstGeom prst="straightConnector1">
@@ -5687,7 +5873,9 @@
               </a:ext>
             </a:extLst>
           </p:cNvPr>
-          <p:cNvCxnSpPr/>
+          <p:cNvCxnSpPr>
+            <a:cxnSpLocks/>
+          </p:cNvCxnSpPr>
           <p:nvPr/>
         </p:nvCxnSpPr>
         <p:spPr>
@@ -5738,8 +5926,8 @@
         </p:nvCxnSpPr>
         <p:spPr>
           <a:xfrm>
-            <a:off x="6994472" y="4496599"/>
-            <a:ext cx="2530528" cy="0"/>
+            <a:off x="6994472" y="4663879"/>
+            <a:ext cx="3117343" cy="0"/>
           </a:xfrm>
           <a:prstGeom prst="straightConnector1">
             <a:avLst/>
@@ -5782,8 +5970,8 @@
         </p:nvCxnSpPr>
         <p:spPr>
           <a:xfrm>
-            <a:off x="6985347" y="4953000"/>
-            <a:ext cx="2515943" cy="0"/>
+            <a:off x="6970570" y="4861319"/>
+            <a:ext cx="3220235" cy="0"/>
           </a:xfrm>
           <a:prstGeom prst="straightConnector1">
             <a:avLst/>
@@ -5812,49 +6000,6 @@
           </a:fontRef>
         </p:style>
       </p:cxnSp>
-      <p:sp>
-        <p:nvSpPr>
-          <p:cNvPr id="111" name="TextBox 110">
-            <a:extLst>
-              <a:ext uri="{FF2B5EF4-FFF2-40B4-BE49-F238E27FC236}">
-                <a16:creationId xmlns:a16="http://schemas.microsoft.com/office/drawing/2014/main" id="{6AC3438E-2193-4FA4-8362-2809A52BD2A5}"/>
-              </a:ext>
-            </a:extLst>
-          </p:cNvPr>
-          <p:cNvSpPr txBox="1"/>
-          <p:nvPr/>
-        </p:nvSpPr>
-        <p:spPr>
-          <a:xfrm>
-            <a:off x="9312033" y="4521884"/>
-            <a:ext cx="1223896" cy="369332"/>
-          </a:xfrm>
-          <a:prstGeom prst="rect">
-            <a:avLst/>
-          </a:prstGeom>
-          <a:noFill/>
-        </p:spPr>
-        <p:txBody>
-          <a:bodyPr wrap="square" rtlCol="0">
-            <a:spAutoFit/>
-          </a:bodyPr>
-          <a:lstStyle/>
-          <a:p>
-            <a:r>
-              <a:rPr lang="en-SG" dirty="0"/>
-              <a:t>(</a:t>
-            </a:r>
-            <a:r>
-              <a:rPr lang="en-SG" dirty="0" err="1"/>
-              <a:t>TaskFilter</a:t>
-            </a:r>
-            <a:r>
-              <a:rPr lang="en-SG" dirty="0"/>
-              <a:t>)</a:t>
-            </a:r>
-          </a:p>
-        </p:txBody>
-      </p:sp>
       <p:sp>
         <p:nvSpPr>
           <p:cNvPr id="112" name="TextBox 111">
@@ -5869,7 +6014,7 @@
         </p:nvSpPr>
         <p:spPr>
           <a:xfrm>
-            <a:off x="7084271" y="4294448"/>
+            <a:off x="7038256" y="4401534"/>
             <a:ext cx="2112731" cy="184665"/>
           </a:xfrm>
           <a:prstGeom prst="rect">
@@ -5901,41 +6046,6 @@
             <a:r>
               <a:rPr lang="en-US" sz="1200" dirty="0"/>
               <a:t>(predicate)</a:t>
-            </a:r>
-          </a:p>
-        </p:txBody>
-      </p:sp>
-      <p:sp>
-        <p:nvSpPr>
-          <p:cNvPr id="113" name="TextBox 112">
-            <a:extLst>
-              <a:ext uri="{FF2B5EF4-FFF2-40B4-BE49-F238E27FC236}">
-                <a16:creationId xmlns:a16="http://schemas.microsoft.com/office/drawing/2014/main" id="{9582257C-D49A-4834-BBE6-B200177A9676}"/>
-              </a:ext>
-            </a:extLst>
-          </p:cNvPr>
-          <p:cNvSpPr txBox="1"/>
-          <p:nvPr/>
-        </p:nvSpPr>
-        <p:spPr>
-          <a:xfrm>
-            <a:off x="8557803" y="1383268"/>
-            <a:ext cx="481884" cy="369332"/>
-          </a:xfrm>
-          <a:prstGeom prst="rect">
-            <a:avLst/>
-          </a:prstGeom>
-          <a:noFill/>
-        </p:spPr>
-        <p:txBody>
-          <a:bodyPr wrap="square" rtlCol="0">
-            <a:spAutoFit/>
-          </a:bodyPr>
-          <a:lstStyle/>
-          <a:p>
-            <a:r>
-              <a:rPr lang="en-SG" dirty="0"/>
-              <a:t>(1)</a:t>
             </a:r>
           </a:p>
         </p:txBody>
@@ -6129,7 +6239,7 @@
         </p:nvSpPr>
         <p:spPr>
           <a:xfrm>
-            <a:off x="172388" y="1376237"/>
+            <a:off x="-361528" y="1376237"/>
             <a:ext cx="8895412" cy="5073769"/>
           </a:xfrm>
           <a:prstGeom prst="roundRect">
@@ -6196,7 +6306,7 @@
         </p:nvSpPr>
         <p:spPr>
           <a:xfrm>
-            <a:off x="4706384" y="2356238"/>
+            <a:off x="4172468" y="2356238"/>
             <a:ext cx="1298078" cy="184666"/>
           </a:xfrm>
           <a:prstGeom prst="rect">
@@ -6265,7 +6375,7 @@
         </p:nvSpPr>
         <p:spPr>
           <a:xfrm>
-            <a:off x="1066800" y="1752600"/>
+            <a:off x="532884" y="1752600"/>
             <a:ext cx="1455629" cy="346760"/>
           </a:xfrm>
           <a:prstGeom prst="rect">
@@ -6341,7 +6451,7 @@
         </p:nvCxnSpPr>
         <p:spPr>
           <a:xfrm>
-            <a:off x="1794615" y="2099360"/>
+            <a:off x="1260699" y="2099360"/>
             <a:ext cx="0" cy="4453840"/>
           </a:xfrm>
           <a:prstGeom prst="line">
@@ -6384,7 +6494,7 @@
         </p:nvSpPr>
         <p:spPr>
           <a:xfrm>
-            <a:off x="1722606" y="2235400"/>
+            <a:off x="1188690" y="2235400"/>
             <a:ext cx="176726" cy="3958373"/>
           </a:xfrm>
           <a:prstGeom prst="rect">
@@ -6437,7 +6547,7 @@
         </p:nvSpPr>
         <p:spPr>
           <a:xfrm>
-            <a:off x="4807936" y="2064079"/>
+            <a:off x="4274020" y="2064079"/>
             <a:ext cx="1219200" cy="467684"/>
           </a:xfrm>
           <a:prstGeom prst="rect">
@@ -6512,7 +6622,7 @@
         </p:nvCxnSpPr>
         <p:spPr>
           <a:xfrm>
-            <a:off x="5421335" y="2548674"/>
+            <a:off x="4887419" y="2548674"/>
             <a:ext cx="36698" cy="1859085"/>
           </a:xfrm>
           <a:prstGeom prst="line">
@@ -6555,7 +6665,7 @@
         </p:nvSpPr>
         <p:spPr>
           <a:xfrm>
-            <a:off x="5328831" y="3006867"/>
+            <a:off x="4794915" y="3006867"/>
             <a:ext cx="198187" cy="1224023"/>
           </a:xfrm>
           <a:prstGeom prst="rect">
@@ -6610,7 +6720,7 @@
         </p:nvCxnSpPr>
         <p:spPr>
           <a:xfrm flipV="1">
-            <a:off x="-121144" y="2418955"/>
+            <a:off x="-655060" y="2252600"/>
             <a:ext cx="1843843" cy="2454"/>
           </a:xfrm>
           <a:prstGeom prst="straightConnector1">
@@ -6654,7 +6764,7 @@
         </p:nvCxnSpPr>
         <p:spPr>
           <a:xfrm flipV="1">
-            <a:off x="3716446" y="3024131"/>
+            <a:off x="3182530" y="3024131"/>
             <a:ext cx="1626684" cy="4348"/>
           </a:xfrm>
           <a:prstGeom prst="straightConnector1">
@@ -6696,8 +6806,8 @@
         </p:nvSpPr>
         <p:spPr>
           <a:xfrm>
-            <a:off x="-540153" y="2147555"/>
-            <a:ext cx="2186846" cy="215444"/>
+            <a:off x="-1074069" y="2286000"/>
+            <a:ext cx="2186846" cy="430887"/>
           </a:xfrm>
           <a:prstGeom prst="rect">
             <a:avLst/>
@@ -6717,7 +6827,7 @@
                   <a:srgbClr val="0070C0"/>
                 </a:solidFill>
               </a:rPr>
-              <a:t>execute(“tasks find cow”)</a:t>
+              <a:t>execute(“tasks find n/cow t/farm”)</a:t>
             </a:r>
           </a:p>
         </p:txBody>
@@ -6736,7 +6846,7 @@
         </p:nvSpPr>
         <p:spPr>
           <a:xfrm>
-            <a:off x="6962576" y="4392586"/>
+            <a:off x="6428660" y="4392586"/>
             <a:ext cx="855809" cy="215444"/>
           </a:xfrm>
           <a:prstGeom prst="rect">
@@ -6784,7 +6894,7 @@
         </p:nvCxnSpPr>
         <p:spPr>
           <a:xfrm flipV="1">
-            <a:off x="3702553" y="4232021"/>
+            <a:off x="3168637" y="4232021"/>
             <a:ext cx="1647585" cy="1"/>
           </a:xfrm>
           <a:prstGeom prst="straightConnector1">
@@ -6830,7 +6940,7 @@
         </p:nvCxnSpPr>
         <p:spPr>
           <a:xfrm>
-            <a:off x="-121144" y="6196312"/>
+            <a:off x="-655060" y="6196312"/>
             <a:ext cx="1843752" cy="0"/>
           </a:xfrm>
           <a:prstGeom prst="straightConnector1">
@@ -6876,7 +6986,7 @@
         </p:nvCxnSpPr>
         <p:spPr>
           <a:xfrm flipV="1">
-            <a:off x="1938431" y="4629553"/>
+            <a:off x="1404515" y="4629553"/>
             <a:ext cx="6121938" cy="18647"/>
           </a:xfrm>
           <a:prstGeom prst="straightConnector1">
@@ -6921,7 +7031,7 @@
         </p:nvCxnSpPr>
         <p:spPr>
           <a:xfrm>
-            <a:off x="1938431" y="5795956"/>
+            <a:off x="1404515" y="5795956"/>
             <a:ext cx="6228070" cy="0"/>
           </a:xfrm>
           <a:prstGeom prst="straightConnector1">
@@ -6965,8 +7075,8 @@
         </p:nvSpPr>
         <p:spPr>
           <a:xfrm>
-            <a:off x="3722666" y="3050328"/>
-            <a:ext cx="1626683" cy="169277"/>
+            <a:off x="3188750" y="3050328"/>
+            <a:ext cx="1626683" cy="338554"/>
           </a:xfrm>
           <a:prstGeom prst="rect">
             <a:avLst/>
@@ -6996,7 +7106,7 @@
             </a:r>
             <a:r>
               <a:rPr lang="en-US" sz="1100" dirty="0"/>
-              <a:t>(“find cow”)</a:t>
+              <a:t>(“find n/cow t/farm”)</a:t>
             </a:r>
           </a:p>
         </p:txBody>
@@ -7015,7 +7125,7 @@
         </p:nvSpPr>
         <p:spPr>
           <a:xfrm>
-            <a:off x="5920435" y="5543715"/>
+            <a:off x="5386519" y="5543715"/>
             <a:ext cx="621216" cy="215444"/>
           </a:xfrm>
           <a:prstGeom prst="rect">
@@ -7061,7 +7171,7 @@
         </p:nvSpPr>
         <p:spPr>
           <a:xfrm>
-            <a:off x="912666" y="5979599"/>
+            <a:off x="378750" y="5979599"/>
             <a:ext cx="440739" cy="215444"/>
           </a:xfrm>
           <a:prstGeom prst="rect">
@@ -7107,7 +7217,7 @@
         </p:nvSpPr>
         <p:spPr>
           <a:xfrm>
-            <a:off x="8626837" y="5072616"/>
+            <a:off x="8092920" y="5101062"/>
             <a:ext cx="1590354" cy="461538"/>
           </a:xfrm>
           <a:prstGeom prst="rect">
@@ -7180,7 +7290,7 @@
         </p:nvSpPr>
         <p:spPr>
           <a:xfrm>
-            <a:off x="9302358" y="5534154"/>
+            <a:off x="8768442" y="5534154"/>
             <a:ext cx="146441" cy="199822"/>
           </a:xfrm>
           <a:prstGeom prst="rect">
@@ -7235,7 +7345,7 @@
         </p:nvCxnSpPr>
         <p:spPr>
           <a:xfrm>
-            <a:off x="8260659" y="5715000"/>
+            <a:off x="7726743" y="5715000"/>
             <a:ext cx="1047061" cy="9452"/>
           </a:xfrm>
           <a:prstGeom prst="straightConnector1">
@@ -7279,7 +7389,7 @@
         </p:nvSpPr>
         <p:spPr>
           <a:xfrm>
-            <a:off x="7522338" y="3462550"/>
+            <a:off x="6988422" y="3462550"/>
             <a:ext cx="1364903" cy="432035"/>
           </a:xfrm>
           <a:prstGeom prst="rect">
@@ -7344,7 +7454,7 @@
         </p:nvSpPr>
         <p:spPr>
           <a:xfrm>
-            <a:off x="8017631" y="3908926"/>
+            <a:off x="7483715" y="3908926"/>
             <a:ext cx="256565" cy="238319"/>
           </a:xfrm>
           <a:prstGeom prst="rect">
@@ -7397,7 +7507,7 @@
         </p:nvSpPr>
         <p:spPr>
           <a:xfrm>
-            <a:off x="8060369" y="4579131"/>
+            <a:off x="7526453" y="4579131"/>
             <a:ext cx="212263" cy="1216825"/>
           </a:xfrm>
           <a:prstGeom prst="rect">
@@ -7452,7 +7562,7 @@
         </p:nvCxnSpPr>
         <p:spPr>
           <a:xfrm flipV="1">
-            <a:off x="5477161" y="3054578"/>
+            <a:off x="4943245" y="3054578"/>
             <a:ext cx="465565" cy="3197"/>
           </a:xfrm>
           <a:prstGeom prst="straightConnector1">
@@ -7496,8 +7606,8 @@
         </p:nvCxnSpPr>
         <p:spPr>
           <a:xfrm>
-            <a:off x="3611695" y="2087553"/>
-            <a:ext cx="12247" cy="3394210"/>
+            <a:off x="3077779" y="2087553"/>
+            <a:ext cx="16113" cy="4465647"/>
           </a:xfrm>
           <a:prstGeom prst="line">
             <a:avLst/>
@@ -7539,7 +7649,7 @@
         </p:nvSpPr>
         <p:spPr>
           <a:xfrm>
-            <a:off x="3517081" y="2382873"/>
+            <a:off x="2983165" y="2382873"/>
             <a:ext cx="206779" cy="2003766"/>
           </a:xfrm>
           <a:prstGeom prst="rect">
@@ -7592,7 +7702,7 @@
         </p:nvSpPr>
         <p:spPr>
           <a:xfrm>
-            <a:off x="5328831" y="2533749"/>
+            <a:off x="4794915" y="2533749"/>
             <a:ext cx="215804" cy="170158"/>
           </a:xfrm>
           <a:prstGeom prst="rect">
@@ -7647,7 +7757,7 @@
         </p:nvCxnSpPr>
         <p:spPr>
           <a:xfrm>
-            <a:off x="3717987" y="2475570"/>
+            <a:off x="3184071" y="2475570"/>
             <a:ext cx="1089949" cy="0"/>
           </a:xfrm>
           <a:prstGeom prst="straightConnector1">
@@ -7691,7 +7801,7 @@
         </p:nvCxnSpPr>
         <p:spPr>
           <a:xfrm>
-            <a:off x="1884845" y="2404127"/>
+            <a:off x="1350929" y="2404127"/>
             <a:ext cx="1623212" cy="0"/>
           </a:xfrm>
           <a:prstGeom prst="straightConnector1">
@@ -7733,8 +7843,8 @@
         </p:nvSpPr>
         <p:spPr>
           <a:xfrm>
-            <a:off x="1869951" y="2462995"/>
-            <a:ext cx="1623213" cy="138499"/>
+            <a:off x="1336035" y="2462995"/>
+            <a:ext cx="1623213" cy="276999"/>
           </a:xfrm>
           <a:prstGeom prst="rect">
             <a:avLst/>
@@ -7764,7 +7874,7 @@
             </a:r>
             <a:r>
               <a:rPr lang="en-US" sz="900" dirty="0"/>
-              <a:t>(“tasks find cow”)</a:t>
+              <a:t>(“tasks find n/cow t/farm”)</a:t>
             </a:r>
           </a:p>
         </p:txBody>
@@ -7785,7 +7895,7 @@
         </p:nvCxnSpPr>
         <p:spPr>
           <a:xfrm flipV="1">
-            <a:off x="1897537" y="4407759"/>
+            <a:off x="1363621" y="4407759"/>
             <a:ext cx="1684372" cy="11841"/>
           </a:xfrm>
           <a:prstGeom prst="straightConnector1">
@@ -7829,7 +7939,7 @@
         </p:nvSpPr>
         <p:spPr>
           <a:xfrm>
-            <a:off x="4495800" y="3962400"/>
+            <a:off x="3961884" y="3962400"/>
             <a:ext cx="65713" cy="215444"/>
           </a:xfrm>
           <a:prstGeom prst="rect">
@@ -7875,7 +7985,7 @@
         </p:nvSpPr>
         <p:spPr>
           <a:xfrm>
-            <a:off x="2671818" y="4133021"/>
+            <a:off x="2137902" y="4133021"/>
             <a:ext cx="65713" cy="215444"/>
           </a:xfrm>
           <a:prstGeom prst="rect">
@@ -7923,7 +8033,7 @@
         </p:nvCxnSpPr>
         <p:spPr>
           <a:xfrm>
-            <a:off x="8284561" y="5285816"/>
+            <a:off x="7750645" y="5314262"/>
             <a:ext cx="330347" cy="0"/>
           </a:xfrm>
           <a:prstGeom prst="straightConnector1">
@@ -7965,7 +8075,7 @@
         </p:nvSpPr>
         <p:spPr>
           <a:xfrm>
-            <a:off x="3023293" y="1727727"/>
+            <a:off x="2489377" y="1727727"/>
             <a:ext cx="1219200" cy="467684"/>
           </a:xfrm>
           <a:prstGeom prst="rect">
@@ -8038,7 +8148,7 @@
         </p:nvCxnSpPr>
         <p:spPr>
           <a:xfrm>
-            <a:off x="3728403" y="2712006"/>
+            <a:off x="3194487" y="2712006"/>
             <a:ext cx="1600428" cy="0"/>
           </a:xfrm>
           <a:prstGeom prst="straightConnector1">
@@ -8084,8 +8194,8 @@
         </p:nvCxnSpPr>
         <p:spPr>
           <a:xfrm>
-            <a:off x="8290389" y="4717006"/>
-            <a:ext cx="2530528" cy="0"/>
+            <a:off x="7770693" y="4827055"/>
+            <a:ext cx="3008013" cy="0"/>
           </a:xfrm>
           <a:prstGeom prst="straightConnector1">
             <a:avLst/>
@@ -8123,13 +8233,14 @@
           </p:cNvPr>
           <p:cNvCxnSpPr>
             <a:cxnSpLocks/>
+            <a:endCxn id="90" idx="2"/>
           </p:cNvCxnSpPr>
           <p:nvPr/>
         </p:nvCxnSpPr>
         <p:spPr>
           <a:xfrm>
-            <a:off x="8304974" y="5029200"/>
-            <a:ext cx="2515943" cy="0"/>
+            <a:off x="7771057" y="5029200"/>
+            <a:ext cx="3116636" cy="32360"/>
           </a:xfrm>
           <a:prstGeom prst="straightConnector1">
             <a:avLst/>
@@ -8158,49 +8269,6 @@
           </a:fontRef>
         </p:style>
       </p:cxnSp>
-      <p:sp>
-        <p:nvSpPr>
-          <p:cNvPr id="111" name="TextBox 110">
-            <a:extLst>
-              <a:ext uri="{FF2B5EF4-FFF2-40B4-BE49-F238E27FC236}">
-                <a16:creationId xmlns:a16="http://schemas.microsoft.com/office/drawing/2014/main" id="{6AC3438E-2193-4FA4-8362-2809A52BD2A5}"/>
-              </a:ext>
-            </a:extLst>
-          </p:cNvPr>
-          <p:cNvSpPr txBox="1"/>
-          <p:nvPr/>
-        </p:nvSpPr>
-        <p:spPr>
-          <a:xfrm>
-            <a:off x="10365736" y="4648200"/>
-            <a:ext cx="1223896" cy="369332"/>
-          </a:xfrm>
-          <a:prstGeom prst="rect">
-            <a:avLst/>
-          </a:prstGeom>
-          <a:noFill/>
-        </p:spPr>
-        <p:txBody>
-          <a:bodyPr wrap="square" rtlCol="0">
-            <a:spAutoFit/>
-          </a:bodyPr>
-          <a:lstStyle/>
-          <a:p>
-            <a:r>
-              <a:rPr lang="en-SG" dirty="0"/>
-              <a:t>(</a:t>
-            </a:r>
-            <a:r>
-              <a:rPr lang="en-SG" dirty="0" err="1"/>
-              <a:t>TaskFilter</a:t>
-            </a:r>
-            <a:r>
-              <a:rPr lang="en-SG" dirty="0"/>
-              <a:t>)</a:t>
-            </a:r>
-          </a:p>
-        </p:txBody>
-      </p:sp>
       <p:sp>
         <p:nvSpPr>
           <p:cNvPr id="112" name="TextBox 111">
@@ -8215,7 +8283,7 @@
         </p:nvSpPr>
         <p:spPr>
           <a:xfrm>
-            <a:off x="8304610" y="4480733"/>
+            <a:off x="7762687" y="4580460"/>
             <a:ext cx="2129458" cy="184666"/>
           </a:xfrm>
           <a:prstGeom prst="rect">
@@ -8253,41 +8321,6 @@
       </p:sp>
       <p:sp>
         <p:nvSpPr>
-          <p:cNvPr id="113" name="TextBox 112">
-            <a:extLst>
-              <a:ext uri="{FF2B5EF4-FFF2-40B4-BE49-F238E27FC236}">
-                <a16:creationId xmlns:a16="http://schemas.microsoft.com/office/drawing/2014/main" id="{9582257C-D49A-4834-BBE6-B200177A9676}"/>
-              </a:ext>
-            </a:extLst>
-          </p:cNvPr>
-          <p:cNvSpPr txBox="1"/>
-          <p:nvPr/>
-        </p:nvSpPr>
-        <p:spPr>
-          <a:xfrm>
-            <a:off x="8557803" y="1383268"/>
-            <a:ext cx="481884" cy="369332"/>
-          </a:xfrm>
-          <a:prstGeom prst="rect">
-            <a:avLst/>
-          </a:prstGeom>
-          <a:noFill/>
-        </p:spPr>
-        <p:txBody>
-          <a:bodyPr wrap="square" rtlCol="0">
-            <a:spAutoFit/>
-          </a:bodyPr>
-          <a:lstStyle/>
-          <a:p>
-            <a:r>
-              <a:rPr lang="en-SG" dirty="0"/>
-              <a:t>(2)</a:t>
-            </a:r>
-          </a:p>
-        </p:txBody>
-      </p:sp>
-      <p:sp>
-        <p:nvSpPr>
           <p:cNvPr id="114" name="TextBox 113">
             <a:extLst>
               <a:ext uri="{FF2B5EF4-FFF2-40B4-BE49-F238E27FC236}">
@@ -8300,7 +8333,7 @@
         </p:nvSpPr>
         <p:spPr>
           <a:xfrm>
-            <a:off x="8026157" y="6149921"/>
+            <a:off x="7492241" y="6149921"/>
             <a:ext cx="258404" cy="261610"/>
           </a:xfrm>
           <a:prstGeom prst="rect">
@@ -8339,7 +8372,7 @@
         </p:nvSpPr>
         <p:spPr>
           <a:xfrm>
-            <a:off x="5328831" y="4279525"/>
+            <a:off x="4794915" y="4279525"/>
             <a:ext cx="258404" cy="261610"/>
           </a:xfrm>
           <a:prstGeom prst="rect">
@@ -8380,7 +8413,7 @@
         </p:nvCxnSpPr>
         <p:spPr>
           <a:xfrm>
-            <a:off x="6993620" y="3644631"/>
+            <a:off x="6459704" y="3644631"/>
             <a:ext cx="528718" cy="1262"/>
           </a:xfrm>
           <a:prstGeom prst="straightConnector1">
@@ -8424,7 +8457,7 @@
         </p:nvCxnSpPr>
         <p:spPr>
           <a:xfrm>
-            <a:off x="7017580" y="4146242"/>
+            <a:off x="6483664" y="4146242"/>
             <a:ext cx="1097328" cy="6418"/>
           </a:xfrm>
           <a:prstGeom prst="straightConnector1">
@@ -8468,8 +8501,8 @@
         </p:nvSpPr>
         <p:spPr>
           <a:xfrm>
-            <a:off x="5583954" y="3599014"/>
-            <a:ext cx="934250" cy="184666"/>
+            <a:off x="5050038" y="3599014"/>
+            <a:ext cx="934250" cy="369332"/>
           </a:xfrm>
           <a:prstGeom prst="rect">
             <a:avLst/>
@@ -8495,7 +8528,7 @@
           <a:p>
             <a:r>
               <a:rPr lang="en-US" sz="1200" dirty="0"/>
-              <a:t>parse(“cow”)</a:t>
+              <a:t>parse(“n/ cow t/farm”)</a:t>
             </a:r>
           </a:p>
         </p:txBody>
@@ -8514,7 +8547,7 @@
         </p:nvSpPr>
         <p:spPr>
           <a:xfrm>
-            <a:off x="5968384" y="2871255"/>
+            <a:off x="5434468" y="2871255"/>
             <a:ext cx="1765043" cy="428838"/>
           </a:xfrm>
           <a:prstGeom prst="rect">
@@ -8589,8 +8622,8 @@
         </p:nvCxnSpPr>
         <p:spPr>
           <a:xfrm>
-            <a:off x="5552676" y="3595129"/>
-            <a:ext cx="1243673" cy="3887"/>
+            <a:off x="5018760" y="3595129"/>
+            <a:ext cx="1259060" cy="0"/>
           </a:xfrm>
           <a:prstGeom prst="straightConnector1">
             <a:avLst/>
@@ -8629,7 +8662,7 @@
         </p:nvSpPr>
         <p:spPr>
           <a:xfrm>
-            <a:off x="6796350" y="3294215"/>
+            <a:off x="6262434" y="3294215"/>
             <a:ext cx="205843" cy="123165"/>
           </a:xfrm>
           <a:prstGeom prst="rect">
@@ -8682,7 +8715,7 @@
         </p:nvSpPr>
         <p:spPr>
           <a:xfrm>
-            <a:off x="6811736" y="3599015"/>
+            <a:off x="6277820" y="3599015"/>
             <a:ext cx="190457" cy="573262"/>
           </a:xfrm>
           <a:prstGeom prst="rect">
@@ -8737,7 +8770,7 @@
         </p:nvCxnSpPr>
         <p:spPr>
           <a:xfrm flipV="1">
-            <a:off x="5552676" y="4180004"/>
+            <a:off x="5018760" y="4180004"/>
             <a:ext cx="1322006" cy="1"/>
           </a:xfrm>
           <a:prstGeom prst="straightConnector1">
@@ -8783,7 +8816,7 @@
         </p:nvCxnSpPr>
         <p:spPr>
           <a:xfrm>
-            <a:off x="5524256" y="3417379"/>
+            <a:off x="4990340" y="3417379"/>
             <a:ext cx="1272093" cy="0"/>
           </a:xfrm>
           <a:prstGeom prst="straightConnector1">
@@ -8827,7 +8860,7 @@
         </p:nvSpPr>
         <p:spPr>
           <a:xfrm>
-            <a:off x="6773802" y="4255854"/>
+            <a:off x="6239886" y="4255854"/>
             <a:ext cx="258404" cy="261610"/>
           </a:xfrm>
           <a:prstGeom prst="rect">
@@ -8866,7 +8899,7 @@
         </p:nvSpPr>
         <p:spPr>
           <a:xfrm>
-            <a:off x="5968384" y="3928200"/>
+            <a:off x="5460363" y="3972713"/>
             <a:ext cx="220343" cy="215444"/>
           </a:xfrm>
           <a:prstGeom prst="rect">
@@ -8914,7 +8947,7 @@
         </p:nvCxnSpPr>
         <p:spPr>
           <a:xfrm>
-            <a:off x="6876479" y="3331485"/>
+            <a:off x="6342563" y="3331485"/>
             <a:ext cx="22790" cy="1055174"/>
           </a:xfrm>
           <a:prstGeom prst="line">
@@ -8959,7 +8992,7 @@
         </p:nvCxnSpPr>
         <p:spPr>
           <a:xfrm>
-            <a:off x="8144014" y="3783680"/>
+            <a:off x="7610098" y="3783680"/>
             <a:ext cx="7841" cy="2454560"/>
           </a:xfrm>
           <a:prstGeom prst="line">
@@ -8988,6 +9021,190 @@
           </a:fontRef>
         </p:style>
       </p:cxnSp>
+      <p:grpSp>
+        <p:nvGrpSpPr>
+          <p:cNvPr id="2" name="Group 1">
+            <a:extLst>
+              <a:ext uri="{FF2B5EF4-FFF2-40B4-BE49-F238E27FC236}">
+                <a16:creationId xmlns:a16="http://schemas.microsoft.com/office/drawing/2014/main" id="{0FB45394-1367-4159-B378-BA5007AAEBA4}"/>
+              </a:ext>
+            </a:extLst>
+          </p:cNvPr>
+          <p:cNvGrpSpPr/>
+          <p:nvPr/>
+        </p:nvGrpSpPr>
+        <p:grpSpPr>
+          <a:xfrm>
+            <a:off x="10246247" y="4381539"/>
+            <a:ext cx="1316989" cy="2247861"/>
+            <a:chOff x="2086356" y="2033592"/>
+            <a:chExt cx="2202424" cy="3759135"/>
+          </a:xfrm>
+        </p:grpSpPr>
+        <p:sp>
+          <p:nvSpPr>
+            <p:cNvPr id="88" name="Rectangle 62">
+              <a:extLst>
+                <a:ext uri="{FF2B5EF4-FFF2-40B4-BE49-F238E27FC236}">
+                  <a16:creationId xmlns:a16="http://schemas.microsoft.com/office/drawing/2014/main" id="{E9B1D8F0-84D3-42BF-93DF-1E3D1F1AD5FC}"/>
+                </a:ext>
+              </a:extLst>
+            </p:cNvPr>
+            <p:cNvSpPr/>
+            <p:nvPr/>
+          </p:nvSpPr>
+          <p:spPr>
+            <a:xfrm>
+              <a:off x="2086356" y="2033592"/>
+              <a:ext cx="2202424" cy="474704"/>
+            </a:xfrm>
+            <a:prstGeom prst="rect">
+              <a:avLst/>
+            </a:prstGeom>
+            <a:solidFill>
+              <a:srgbClr val="7030A0"/>
+            </a:solidFill>
+            <a:ln w="19050">
+              <a:solidFill>
+                <a:srgbClr val="7030A0"/>
+              </a:solidFill>
+            </a:ln>
+            <a:effectLst/>
+          </p:spPr>
+          <p:style>
+            <a:lnRef idx="1">
+              <a:schemeClr val="accent2"/>
+            </a:lnRef>
+            <a:fillRef idx="2">
+              <a:schemeClr val="accent2"/>
+            </a:fillRef>
+            <a:effectRef idx="1">
+              <a:schemeClr val="accent2"/>
+            </a:effectRef>
+            <a:fontRef idx="minor">
+              <a:schemeClr val="dk1"/>
+            </a:fontRef>
+          </p:style>
+          <p:txBody>
+            <a:bodyPr rtlCol="0" anchor="ctr"/>
+            <a:lstStyle/>
+            <a:p>
+              <a:pPr algn="ctr"/>
+              <a:r>
+                <a:rPr lang="en-US" sz="1400" dirty="0">
+                  <a:solidFill>
+                    <a:schemeClr val="bg1"/>
+                  </a:solidFill>
+                </a:rPr>
+                <a:t>model: Model</a:t>
+              </a:r>
+              <a:endParaRPr lang="en-SG" sz="1400" dirty="0">
+                <a:solidFill>
+                  <a:schemeClr val="bg1"/>
+                </a:solidFill>
+              </a:endParaRPr>
+            </a:p>
+          </p:txBody>
+        </p:sp>
+        <p:cxnSp>
+          <p:nvCxnSpPr>
+            <p:cNvPr id="89" name="Straight Connector 88">
+              <a:extLst>
+                <a:ext uri="{FF2B5EF4-FFF2-40B4-BE49-F238E27FC236}">
+                  <a16:creationId xmlns:a16="http://schemas.microsoft.com/office/drawing/2014/main" id="{78F5A792-FE88-41A1-BFFD-598AA8907269}"/>
+                </a:ext>
+              </a:extLst>
+            </p:cNvPr>
+            <p:cNvCxnSpPr>
+              <a:cxnSpLocks/>
+            </p:cNvCxnSpPr>
+            <p:nvPr/>
+          </p:nvCxnSpPr>
+          <p:spPr>
+            <a:xfrm>
+              <a:off x="3133605" y="2508296"/>
+              <a:ext cx="0" cy="3284431"/>
+            </a:xfrm>
+            <a:prstGeom prst="line">
+              <a:avLst/>
+            </a:prstGeom>
+            <a:ln w="19050">
+              <a:solidFill>
+                <a:srgbClr val="7030A0"/>
+              </a:solidFill>
+              <a:prstDash val="sysDash"/>
+            </a:ln>
+            <a:effectLst/>
+          </p:spPr>
+          <p:style>
+            <a:lnRef idx="1">
+              <a:schemeClr val="accent1"/>
+            </a:lnRef>
+            <a:fillRef idx="2">
+              <a:schemeClr val="accent1"/>
+            </a:fillRef>
+            <a:effectRef idx="1">
+              <a:schemeClr val="accent1"/>
+            </a:effectRef>
+            <a:fontRef idx="minor">
+              <a:schemeClr val="dk1"/>
+            </a:fontRef>
+          </p:style>
+        </p:cxnSp>
+        <p:sp>
+          <p:nvSpPr>
+            <p:cNvPr id="90" name="Rectangle 89">
+              <a:extLst>
+                <a:ext uri="{FF2B5EF4-FFF2-40B4-BE49-F238E27FC236}">
+                  <a16:creationId xmlns:a16="http://schemas.microsoft.com/office/drawing/2014/main" id="{134B158C-202E-4EAF-8CB4-BBAC2F759D7F}"/>
+                </a:ext>
+              </a:extLst>
+            </p:cNvPr>
+            <p:cNvSpPr/>
+            <p:nvPr/>
+          </p:nvSpPr>
+          <p:spPr>
+            <a:xfrm>
+              <a:off x="2976797" y="2778636"/>
+              <a:ext cx="364520" cy="392167"/>
+            </a:xfrm>
+            <a:prstGeom prst="rect">
+              <a:avLst/>
+            </a:prstGeom>
+            <a:solidFill>
+              <a:srgbClr val="7030A0"/>
+            </a:solidFill>
+            <a:ln>
+              <a:solidFill>
+                <a:srgbClr val="7030A0"/>
+              </a:solidFill>
+            </a:ln>
+            <a:effectLst/>
+          </p:spPr>
+          <p:style>
+            <a:lnRef idx="1">
+              <a:schemeClr val="accent3"/>
+            </a:lnRef>
+            <a:fillRef idx="2">
+              <a:schemeClr val="accent3"/>
+            </a:fillRef>
+            <a:effectRef idx="1">
+              <a:schemeClr val="accent3"/>
+            </a:effectRef>
+            <a:fontRef idx="minor">
+              <a:schemeClr val="dk1"/>
+            </a:fontRef>
+          </p:style>
+          <p:txBody>
+            <a:bodyPr rtlCol="0" anchor="ctr"/>
+            <a:lstStyle/>
+            <a:p>
+              <a:pPr algn="ctr"/>
+              <a:endParaRPr lang="en-SG" sz="1400"/>
+            </a:p>
+          </p:txBody>
+        </p:sp>
+      </p:grpSp>
     </p:spTree>
     <p:extLst>
       <p:ext uri="{BB962C8B-B14F-4D97-AF65-F5344CB8AC3E}">
@@ -9018,818 +9235,701 @@
           <a:chExt cx="0" cy="0"/>
         </a:xfrm>
       </p:grpSpPr>
-      <p:sp>
-        <p:nvSpPr>
-          <p:cNvPr id="56" name="Rectangle 65"/>
-          <p:cNvSpPr/>
+      <p:grpSp>
+        <p:nvGrpSpPr>
+          <p:cNvPr id="8" name="Group 7">
+            <a:extLst>
+              <a:ext uri="{FF2B5EF4-FFF2-40B4-BE49-F238E27FC236}">
+                <a16:creationId xmlns:a16="http://schemas.microsoft.com/office/drawing/2014/main" id="{A95C4B35-E44E-4E5D-9AB4-BA51E2A95E13}"/>
+              </a:ext>
+            </a:extLst>
+          </p:cNvPr>
+          <p:cNvGrpSpPr/>
           <p:nvPr/>
-        </p:nvSpPr>
-        <p:spPr>
-          <a:xfrm>
-            <a:off x="2971800" y="1524000"/>
-            <a:ext cx="3505200" cy="3352800"/>
-          </a:xfrm>
-          <a:prstGeom prst="roundRect">
-            <a:avLst>
-              <a:gd name="adj" fmla="val 3484"/>
-            </a:avLst>
-          </a:prstGeom>
-          <a:solidFill>
-            <a:schemeClr val="accent4">
-              <a:lumMod val="20000"/>
-              <a:lumOff val="80000"/>
-            </a:schemeClr>
-          </a:solidFill>
-          <a:ln w="19050">
-            <a:noFill/>
-          </a:ln>
-          <a:effectLst/>
-        </p:spPr>
-        <p:style>
-          <a:lnRef idx="1">
-            <a:schemeClr val="accent2"/>
-          </a:lnRef>
-          <a:fillRef idx="2">
-            <a:schemeClr val="accent2"/>
-          </a:fillRef>
-          <a:effectRef idx="1">
-            <a:schemeClr val="accent2"/>
-          </a:effectRef>
-          <a:fontRef idx="minor">
-            <a:schemeClr val="dk1"/>
-          </a:fontRef>
-        </p:style>
-        <p:txBody>
-          <a:bodyPr rtlCol="0" anchor="t"/>
-          <a:lstStyle/>
-          <a:p>
-            <a:r>
-              <a:rPr lang="en-US" sz="1200" b="1" dirty="0">
+        </p:nvGrpSpPr>
+        <p:grpSpPr>
+          <a:xfrm>
+            <a:off x="1395250" y="1574274"/>
+            <a:ext cx="5005550" cy="3302525"/>
+            <a:chOff x="1395250" y="1524000"/>
+            <a:chExt cx="5081750" cy="3352800"/>
+          </a:xfrm>
+        </p:grpSpPr>
+        <p:sp>
+          <p:nvSpPr>
+            <p:cNvPr id="56" name="Rectangle 65"/>
+            <p:cNvSpPr/>
+            <p:nvPr/>
+          </p:nvSpPr>
+          <p:spPr>
+            <a:xfrm>
+              <a:off x="2971800" y="1524000"/>
+              <a:ext cx="3505200" cy="3352800"/>
+            </a:xfrm>
+            <a:prstGeom prst="roundRect">
+              <a:avLst>
+                <a:gd name="adj" fmla="val 3484"/>
+              </a:avLst>
+            </a:prstGeom>
+            <a:solidFill>
+              <a:schemeClr val="accent4">
+                <a:lumMod val="20000"/>
+                <a:lumOff val="80000"/>
+              </a:schemeClr>
+            </a:solidFill>
+            <a:ln w="19050">
+              <a:noFill/>
+            </a:ln>
+            <a:effectLst/>
+          </p:spPr>
+          <p:style>
+            <a:lnRef idx="1">
+              <a:schemeClr val="accent2"/>
+            </a:lnRef>
+            <a:fillRef idx="2">
+              <a:schemeClr val="accent2"/>
+            </a:fillRef>
+            <a:effectRef idx="1">
+              <a:schemeClr val="accent2"/>
+            </a:effectRef>
+            <a:fontRef idx="minor">
+              <a:schemeClr val="dk1"/>
+            </a:fontRef>
+          </p:style>
+          <p:txBody>
+            <a:bodyPr rtlCol="0" anchor="t"/>
+            <a:lstStyle/>
+            <a:p>
+              <a:r>
+                <a:rPr lang="en-US" sz="1200" b="1" dirty="0">
+                  <a:solidFill>
+                    <a:srgbClr val="7030A0"/>
+                  </a:solidFill>
+                </a:rPr>
+                <a:t>Model</a:t>
+              </a:r>
+              <a:endParaRPr lang="en-SG" sz="1200" b="1" dirty="0">
                 <a:solidFill>
                   <a:srgbClr val="7030A0"/>
                 </a:solidFill>
-              </a:rPr>
-              <a:t>Model</a:t>
-            </a:r>
-            <a:endParaRPr lang="en-SG" sz="1200" b="1" dirty="0">
+              </a:endParaRPr>
+            </a:p>
+          </p:txBody>
+        </p:sp>
+        <p:sp>
+          <p:nvSpPr>
+            <p:cNvPr id="86" name="Rectangle 85"/>
+            <p:cNvSpPr/>
+            <p:nvPr/>
+          </p:nvSpPr>
+          <p:spPr>
+            <a:xfrm>
+              <a:off x="5322221" y="3192083"/>
+              <a:ext cx="129933" cy="398562"/>
+            </a:xfrm>
+            <a:prstGeom prst="rect">
+              <a:avLst/>
+            </a:prstGeom>
+            <a:solidFill>
+              <a:srgbClr val="7030A0"/>
+            </a:solidFill>
+            <a:ln>
               <a:solidFill>
                 <a:srgbClr val="7030A0"/>
               </a:solidFill>
-            </a:endParaRPr>
-          </a:p>
-        </p:txBody>
-      </p:sp>
-      <p:sp>
-        <p:nvSpPr>
-          <p:cNvPr id="81" name="Rectangle 65"/>
-          <p:cNvSpPr/>
-          <p:nvPr/>
-        </p:nvSpPr>
-        <p:spPr>
-          <a:xfrm>
-            <a:off x="666432" y="2743199"/>
-            <a:ext cx="1437504" cy="1295400"/>
-          </a:xfrm>
-          <a:prstGeom prst="roundRect">
-            <a:avLst>
-              <a:gd name="adj" fmla="val 3484"/>
-            </a:avLst>
-          </a:prstGeom>
-          <a:solidFill>
-            <a:schemeClr val="accent1">
-              <a:lumMod val="20000"/>
-              <a:lumOff val="80000"/>
-            </a:schemeClr>
-          </a:solidFill>
-          <a:ln w="19050">
-            <a:noFill/>
-          </a:ln>
-          <a:effectLst/>
-        </p:spPr>
-        <p:style>
-          <a:lnRef idx="1">
-            <a:schemeClr val="accent2"/>
-          </a:lnRef>
-          <a:fillRef idx="2">
-            <a:schemeClr val="accent2"/>
-          </a:fillRef>
-          <a:effectRef idx="1">
-            <a:schemeClr val="accent2"/>
-          </a:effectRef>
-          <a:fontRef idx="minor">
-            <a:schemeClr val="dk1"/>
-          </a:fontRef>
-        </p:style>
-        <p:txBody>
-          <a:bodyPr rtlCol="0" anchor="t"/>
-          <a:lstStyle/>
-          <a:p>
-            <a:r>
-              <a:rPr lang="en-US" sz="1200" b="1" dirty="0">
+            </a:ln>
+            <a:effectLst/>
+          </p:spPr>
+          <p:style>
+            <a:lnRef idx="1">
+              <a:schemeClr val="accent3"/>
+            </a:lnRef>
+            <a:fillRef idx="2">
+              <a:schemeClr val="accent3"/>
+            </a:fillRef>
+            <a:effectRef idx="1">
+              <a:schemeClr val="accent3"/>
+            </a:effectRef>
+            <a:fontRef idx="minor">
+              <a:schemeClr val="dk1"/>
+            </a:fontRef>
+          </p:style>
+          <p:txBody>
+            <a:bodyPr rtlCol="0" anchor="ctr"/>
+            <a:lstStyle/>
+            <a:p>
+              <a:pPr algn="ctr"/>
+              <a:endParaRPr lang="en-SG" sz="1400" dirty="0"/>
+            </a:p>
+          </p:txBody>
+        </p:sp>
+        <p:sp>
+          <p:nvSpPr>
+            <p:cNvPr id="40" name="Rectangle 62"/>
+            <p:cNvSpPr/>
+            <p:nvPr/>
+          </p:nvSpPr>
+          <p:spPr>
+            <a:xfrm>
+              <a:off x="3064298" y="2407771"/>
+              <a:ext cx="1219200" cy="335428"/>
+            </a:xfrm>
+            <a:prstGeom prst="rect">
+              <a:avLst/>
+            </a:prstGeom>
+            <a:solidFill>
+              <a:srgbClr val="7030A0"/>
+            </a:solidFill>
+            <a:ln w="19050">
+              <a:solidFill>
+                <a:srgbClr val="7030A0"/>
+              </a:solidFill>
+            </a:ln>
+            <a:effectLst/>
+          </p:spPr>
+          <p:style>
+            <a:lnRef idx="1">
+              <a:schemeClr val="accent2"/>
+            </a:lnRef>
+            <a:fillRef idx="2">
+              <a:schemeClr val="accent2"/>
+            </a:fillRef>
+            <a:effectRef idx="1">
+              <a:schemeClr val="accent2"/>
+            </a:effectRef>
+            <a:fontRef idx="minor">
+              <a:schemeClr val="dk1"/>
+            </a:fontRef>
+          </p:style>
+          <p:txBody>
+            <a:bodyPr rtlCol="0" anchor="ctr"/>
+            <a:lstStyle/>
+            <a:p>
+              <a:pPr algn="ctr"/>
+              <a:r>
+                <a:rPr lang="en-US" sz="1400" dirty="0">
+                  <a:solidFill>
+                    <a:schemeClr val="bg1"/>
+                  </a:solidFill>
+                </a:rPr>
+                <a:t>model: Model</a:t>
+              </a:r>
+              <a:endParaRPr lang="en-SG" sz="1400" dirty="0">
                 <a:solidFill>
-                  <a:srgbClr val="0070C0"/>
+                  <a:schemeClr val="bg1"/>
                 </a:solidFill>
-              </a:rPr>
-              <a:t>Logic</a:t>
-            </a:r>
-            <a:endParaRPr lang="en-SG" sz="1200" b="1" dirty="0">
+              </a:endParaRPr>
+            </a:p>
+          </p:txBody>
+        </p:sp>
+        <p:cxnSp>
+          <p:nvCxnSpPr>
+            <p:cNvPr id="46" name="Straight Connector 45"/>
+            <p:cNvCxnSpPr>
+              <a:cxnSpLocks/>
+            </p:cNvCxnSpPr>
+            <p:nvPr/>
+          </p:nvCxnSpPr>
+          <p:spPr>
+            <a:xfrm flipH="1">
+              <a:off x="3529532" y="2683014"/>
+              <a:ext cx="3959" cy="1735710"/>
+            </a:xfrm>
+            <a:prstGeom prst="line">
+              <a:avLst/>
+            </a:prstGeom>
+            <a:ln w="19050">
+              <a:solidFill>
+                <a:srgbClr val="7030A0"/>
+              </a:solidFill>
+              <a:prstDash val="sysDash"/>
+            </a:ln>
+            <a:effectLst/>
+          </p:spPr>
+          <p:style>
+            <a:lnRef idx="1">
+              <a:schemeClr val="accent1"/>
+            </a:lnRef>
+            <a:fillRef idx="2">
+              <a:schemeClr val="accent1"/>
+            </a:fillRef>
+            <a:effectRef idx="1">
+              <a:schemeClr val="accent1"/>
+            </a:effectRef>
+            <a:fontRef idx="minor">
+              <a:schemeClr val="dk1"/>
+            </a:fontRef>
+          </p:style>
+        </p:cxnSp>
+        <p:sp>
+          <p:nvSpPr>
+            <p:cNvPr id="49" name="Rectangle 48"/>
+            <p:cNvSpPr/>
+            <p:nvPr/>
+          </p:nvSpPr>
+          <p:spPr>
+            <a:xfrm>
+              <a:off x="3430568" y="2987814"/>
+              <a:ext cx="168896" cy="775693"/>
+            </a:xfrm>
+            <a:prstGeom prst="rect">
+              <a:avLst/>
+            </a:prstGeom>
+            <a:solidFill>
+              <a:srgbClr val="7030A0"/>
+            </a:solidFill>
+            <a:ln>
+              <a:solidFill>
+                <a:srgbClr val="7030A0"/>
+              </a:solidFill>
+            </a:ln>
+            <a:effectLst/>
+          </p:spPr>
+          <p:style>
+            <a:lnRef idx="1">
+              <a:schemeClr val="accent3"/>
+            </a:lnRef>
+            <a:fillRef idx="2">
+              <a:schemeClr val="accent3"/>
+            </a:fillRef>
+            <a:effectRef idx="1">
+              <a:schemeClr val="accent3"/>
+            </a:effectRef>
+            <a:fontRef idx="minor">
+              <a:schemeClr val="dk1"/>
+            </a:fontRef>
+          </p:style>
+          <p:txBody>
+            <a:bodyPr rtlCol="0" anchor="ctr"/>
+            <a:lstStyle/>
+            <a:p>
+              <a:pPr algn="ctr"/>
+              <a:endParaRPr lang="en-SG" sz="1400"/>
+            </a:p>
+          </p:txBody>
+        </p:sp>
+        <p:cxnSp>
+          <p:nvCxnSpPr>
+            <p:cNvPr id="50" name="Straight Arrow Connector 49"/>
+            <p:cNvCxnSpPr>
+              <a:cxnSpLocks/>
+            </p:cNvCxnSpPr>
+            <p:nvPr/>
+          </p:nvCxnSpPr>
+          <p:spPr>
+            <a:xfrm>
+              <a:off x="1395250" y="3010970"/>
+              <a:ext cx="2035318" cy="0"/>
+            </a:xfrm>
+            <a:prstGeom prst="straightConnector1">
+              <a:avLst/>
+            </a:prstGeom>
+            <a:ln w="19050">
               <a:solidFill>
                 <a:srgbClr val="0070C0"/>
               </a:solidFill>
-            </a:endParaRPr>
-          </a:p>
-        </p:txBody>
-      </p:sp>
-      <p:sp>
-        <p:nvSpPr>
-          <p:cNvPr id="86" name="Rectangle 85"/>
-          <p:cNvSpPr/>
-          <p:nvPr/>
-        </p:nvSpPr>
-        <p:spPr>
-          <a:xfrm>
-            <a:off x="5322221" y="3192083"/>
-            <a:ext cx="129933" cy="398562"/>
-          </a:xfrm>
-          <a:prstGeom prst="rect">
-            <a:avLst/>
-          </a:prstGeom>
-          <a:solidFill>
-            <a:srgbClr val="7030A0"/>
-          </a:solidFill>
-          <a:ln>
+              <a:tailEnd type="arrow"/>
+            </a:ln>
+          </p:spPr>
+          <p:style>
+            <a:lnRef idx="1">
+              <a:schemeClr val="accent1"/>
+            </a:lnRef>
+            <a:fillRef idx="0">
+              <a:schemeClr val="accent1"/>
+            </a:fillRef>
+            <a:effectRef idx="0">
+              <a:schemeClr val="accent1"/>
+            </a:effectRef>
+            <a:fontRef idx="minor">
+              <a:schemeClr val="tx1"/>
+            </a:fontRef>
+          </p:style>
+        </p:cxnSp>
+        <p:cxnSp>
+          <p:nvCxnSpPr>
+            <p:cNvPr id="89" name="Straight Connector 88">
+              <a:extLst>
+                <a:ext uri="{FF2B5EF4-FFF2-40B4-BE49-F238E27FC236}">
+                  <a16:creationId xmlns:a16="http://schemas.microsoft.com/office/drawing/2014/main" id="{E4E1C8CA-49DF-45D8-80A5-D5C8282EE927}"/>
+                </a:ext>
+              </a:extLst>
+            </p:cNvPr>
+            <p:cNvCxnSpPr>
+              <a:cxnSpLocks/>
+            </p:cNvCxnSpPr>
+            <p:nvPr/>
+          </p:nvCxnSpPr>
+          <p:spPr>
+            <a:xfrm>
+              <a:off x="5397418" y="2884360"/>
+              <a:ext cx="17996" cy="1467648"/>
+            </a:xfrm>
+            <a:prstGeom prst="line">
+              <a:avLst/>
+            </a:prstGeom>
+            <a:ln w="19050">
+              <a:solidFill>
+                <a:srgbClr val="7030A0"/>
+              </a:solidFill>
+              <a:prstDash val="sysDash"/>
+            </a:ln>
+            <a:effectLst/>
+          </p:spPr>
+          <p:style>
+            <a:lnRef idx="1">
+              <a:schemeClr val="accent1"/>
+            </a:lnRef>
+            <a:fillRef idx="2">
+              <a:schemeClr val="accent1"/>
+            </a:fillRef>
+            <a:effectRef idx="1">
+              <a:schemeClr val="accent1"/>
+            </a:effectRef>
+            <a:fontRef idx="minor">
+              <a:schemeClr val="dk1"/>
+            </a:fontRef>
+          </p:style>
+        </p:cxnSp>
+        <p:cxnSp>
+          <p:nvCxnSpPr>
+            <p:cNvPr id="52" name="Straight Arrow Connector 51"/>
+            <p:cNvCxnSpPr>
+              <a:cxnSpLocks/>
+            </p:cNvCxnSpPr>
+            <p:nvPr/>
+          </p:nvCxnSpPr>
+          <p:spPr>
+            <a:xfrm flipV="1">
+              <a:off x="3587032" y="3210068"/>
+              <a:ext cx="1732540" cy="2479"/>
+            </a:xfrm>
+            <a:prstGeom prst="straightConnector1">
+              <a:avLst/>
+            </a:prstGeom>
+            <a:ln w="19050">
+              <a:solidFill>
+                <a:srgbClr val="7030A0"/>
+              </a:solidFill>
+              <a:tailEnd type="arrow"/>
+            </a:ln>
+          </p:spPr>
+          <p:style>
+            <a:lnRef idx="1">
+              <a:schemeClr val="accent1"/>
+            </a:lnRef>
+            <a:fillRef idx="0">
+              <a:schemeClr val="accent1"/>
+            </a:fillRef>
+            <a:effectRef idx="0">
+              <a:schemeClr val="accent1"/>
+            </a:effectRef>
+            <a:fontRef idx="minor">
+              <a:schemeClr val="tx1"/>
+            </a:fontRef>
+          </p:style>
+        </p:cxnSp>
+        <p:cxnSp>
+          <p:nvCxnSpPr>
+            <p:cNvPr id="60" name="Straight Arrow Connector 59">
+              <a:extLst>
+                <a:ext uri="{FF2B5EF4-FFF2-40B4-BE49-F238E27FC236}">
+                  <a16:creationId xmlns:a16="http://schemas.microsoft.com/office/drawing/2014/main" id="{7C9F21BC-13A9-471F-825A-2621FD36355F}"/>
+                </a:ext>
+              </a:extLst>
+            </p:cNvPr>
+            <p:cNvCxnSpPr>
+              <a:cxnSpLocks/>
+              <a:endCxn id="86" idx="2"/>
+            </p:cNvCxnSpPr>
+            <p:nvPr/>
+          </p:nvCxnSpPr>
+          <p:spPr>
+            <a:xfrm>
+              <a:off x="3587032" y="3569843"/>
+              <a:ext cx="1800156" cy="20802"/>
+            </a:xfrm>
+            <a:prstGeom prst="straightConnector1">
+              <a:avLst/>
+            </a:prstGeom>
+            <a:ln w="19050">
+              <a:solidFill>
+                <a:srgbClr val="7030A0"/>
+              </a:solidFill>
+              <a:prstDash val="sysDash"/>
+              <a:headEnd type="arrow" w="med" len="med"/>
+              <a:tailEnd type="none" w="med" len="med"/>
+            </a:ln>
+          </p:spPr>
+          <p:style>
+            <a:lnRef idx="1">
+              <a:schemeClr val="accent1"/>
+            </a:lnRef>
+            <a:fillRef idx="0">
+              <a:schemeClr val="accent1"/>
+            </a:fillRef>
+            <a:effectRef idx="0">
+              <a:schemeClr val="accent1"/>
+            </a:effectRef>
+            <a:fontRef idx="minor">
+              <a:schemeClr val="tx1"/>
+            </a:fontRef>
+          </p:style>
+        </p:cxnSp>
+        <p:cxnSp>
+          <p:nvCxnSpPr>
+            <p:cNvPr id="63" name="Straight Arrow Connector 62">
+              <a:extLst>
+                <a:ext uri="{FF2B5EF4-FFF2-40B4-BE49-F238E27FC236}">
+                  <a16:creationId xmlns:a16="http://schemas.microsoft.com/office/drawing/2014/main" id="{7C9F21BC-13A9-471F-825A-2621FD36355F}"/>
+                </a:ext>
+              </a:extLst>
+            </p:cNvPr>
+            <p:cNvCxnSpPr>
+              <a:cxnSpLocks/>
+            </p:cNvCxnSpPr>
+            <p:nvPr/>
+          </p:nvCxnSpPr>
+          <p:spPr>
+            <a:xfrm>
+              <a:off x="1395250" y="3763507"/>
+              <a:ext cx="2035318" cy="0"/>
+            </a:xfrm>
+            <a:prstGeom prst="straightConnector1">
+              <a:avLst/>
+            </a:prstGeom>
+            <a:ln w="19050">
+              <a:solidFill>
+                <a:srgbClr val="7030A0"/>
+              </a:solidFill>
+              <a:prstDash val="sysDash"/>
+              <a:headEnd type="arrow" w="med" len="med"/>
+              <a:tailEnd type="none" w="med" len="med"/>
+            </a:ln>
+          </p:spPr>
+          <p:style>
+            <a:lnRef idx="1">
+              <a:schemeClr val="accent1"/>
+            </a:lnRef>
+            <a:fillRef idx="0">
+              <a:schemeClr val="accent1"/>
+            </a:fillRef>
+            <a:effectRef idx="0">
+              <a:schemeClr val="accent1"/>
+            </a:effectRef>
+            <a:fontRef idx="minor">
+              <a:schemeClr val="tx1"/>
+            </a:fontRef>
+          </p:style>
+        </p:cxnSp>
+        <p:sp>
+          <p:nvSpPr>
+            <p:cNvPr id="44" name="TextBox 43">
+              <a:extLst>
+                <a:ext uri="{FF2B5EF4-FFF2-40B4-BE49-F238E27FC236}">
+                  <a16:creationId xmlns:a16="http://schemas.microsoft.com/office/drawing/2014/main" id="{4ED6EC67-E3C8-4579-BC04-6CF8E451E6E9}"/>
+                </a:ext>
+              </a:extLst>
+            </p:cNvPr>
+            <p:cNvSpPr txBox="1"/>
+            <p:nvPr/>
+          </p:nvSpPr>
+          <p:spPr>
+            <a:xfrm>
+              <a:off x="1395250" y="2828453"/>
+              <a:ext cx="1996232" cy="169277"/>
+            </a:xfrm>
+            <a:prstGeom prst="rect">
+              <a:avLst/>
+            </a:prstGeom>
+            <a:noFill/>
+          </p:spPr>
+          <p:txBody>
+            <a:bodyPr wrap="square" lIns="0" tIns="0" rIns="0" bIns="0" rtlCol="0">
+              <a:spAutoFit/>
+            </a:bodyPr>
+            <a:lstStyle>
+              <a:defPPr>
+                <a:defRPr lang="en-US"/>
+              </a:defPPr>
+              <a:lvl1pPr algn="r">
+                <a:defRPr sz="1400">
+                  <a:solidFill>
+                    <a:srgbClr val="0070C0"/>
+                  </a:solidFill>
+                </a:defRPr>
+              </a:lvl1pPr>
+            </a:lstStyle>
+            <a:p>
+              <a:r>
+                <a:rPr lang="en-US" sz="1100" dirty="0" err="1"/>
+                <a:t>updateFilteredTaskList</a:t>
+              </a:r>
+              <a:r>
+                <a:rPr lang="en-US" sz="1100" dirty="0"/>
+                <a:t>(predicate)</a:t>
+              </a:r>
+            </a:p>
+          </p:txBody>
+        </p:sp>
+        <p:sp>
+          <p:nvSpPr>
+            <p:cNvPr id="51" name="Rectangle 62">
+              <a:extLst>
+                <a:ext uri="{FF2B5EF4-FFF2-40B4-BE49-F238E27FC236}">
+                  <a16:creationId xmlns:a16="http://schemas.microsoft.com/office/drawing/2014/main" id="{D2E92B75-FB28-4890-A92D-C5555A186336}"/>
+                </a:ext>
+              </a:extLst>
+            </p:cNvPr>
+            <p:cNvSpPr/>
+            <p:nvPr/>
+          </p:nvSpPr>
+          <p:spPr>
+            <a:xfrm>
+              <a:off x="4555117" y="2452324"/>
+              <a:ext cx="1559485" cy="435456"/>
+            </a:xfrm>
+            <a:prstGeom prst="rect">
+              <a:avLst/>
+            </a:prstGeom>
             <a:solidFill>
               <a:srgbClr val="7030A0"/>
             </a:solidFill>
-          </a:ln>
-          <a:effectLst/>
-        </p:spPr>
-        <p:style>
-          <a:lnRef idx="1">
-            <a:schemeClr val="accent3"/>
-          </a:lnRef>
-          <a:fillRef idx="2">
-            <a:schemeClr val="accent3"/>
-          </a:fillRef>
-          <a:effectRef idx="1">
-            <a:schemeClr val="accent3"/>
-          </a:effectRef>
-          <a:fontRef idx="minor">
-            <a:schemeClr val="dk1"/>
-          </a:fontRef>
-        </p:style>
-        <p:txBody>
-          <a:bodyPr rtlCol="0" anchor="ctr"/>
-          <a:lstStyle/>
-          <a:p>
-            <a:pPr algn="ctr"/>
-            <a:endParaRPr lang="en-SG" sz="1400" dirty="0"/>
-          </a:p>
-        </p:txBody>
-      </p:sp>
-      <p:sp>
-        <p:nvSpPr>
-          <p:cNvPr id="40" name="Rectangle 62"/>
-          <p:cNvSpPr/>
-          <p:nvPr/>
-        </p:nvSpPr>
-        <p:spPr>
-          <a:xfrm>
-            <a:off x="3064298" y="2407771"/>
-            <a:ext cx="1219200" cy="335428"/>
-          </a:xfrm>
-          <a:prstGeom prst="rect">
-            <a:avLst/>
-          </a:prstGeom>
-          <a:solidFill>
-            <a:srgbClr val="7030A0"/>
-          </a:solidFill>
-          <a:ln w="19050">
-            <a:solidFill>
-              <a:srgbClr val="7030A0"/>
-            </a:solidFill>
-          </a:ln>
-          <a:effectLst/>
-        </p:spPr>
-        <p:style>
-          <a:lnRef idx="1">
-            <a:schemeClr val="accent2"/>
-          </a:lnRef>
-          <a:fillRef idx="2">
-            <a:schemeClr val="accent2"/>
-          </a:fillRef>
-          <a:effectRef idx="1">
-            <a:schemeClr val="accent2"/>
-          </a:effectRef>
-          <a:fontRef idx="minor">
-            <a:schemeClr val="dk1"/>
-          </a:fontRef>
-        </p:style>
-        <p:txBody>
-          <a:bodyPr rtlCol="0" anchor="ctr"/>
-          <a:lstStyle/>
-          <a:p>
-            <a:pPr algn="ctr"/>
-            <a:r>
-              <a:rPr lang="en-US" sz="1400" dirty="0">
+            <a:ln w="19050">
+              <a:solidFill>
+                <a:srgbClr val="7030A0"/>
+              </a:solidFill>
+            </a:ln>
+            <a:effectLst/>
+          </p:spPr>
+          <p:style>
+            <a:lnRef idx="1">
+              <a:schemeClr val="accent2"/>
+            </a:lnRef>
+            <a:fillRef idx="2">
+              <a:schemeClr val="accent2"/>
+            </a:fillRef>
+            <a:effectRef idx="1">
+              <a:schemeClr val="accent2"/>
+            </a:effectRef>
+            <a:fontRef idx="minor">
+              <a:schemeClr val="dk1"/>
+            </a:fontRef>
+          </p:style>
+          <p:txBody>
+            <a:bodyPr rtlCol="0" anchor="ctr"/>
+            <a:lstStyle/>
+            <a:p>
+              <a:pPr algn="ctr"/>
+              <a:r>
+                <a:rPr lang="en-US" sz="1400" dirty="0" err="1">
+                  <a:solidFill>
+                    <a:schemeClr val="bg1"/>
+                  </a:solidFill>
+                </a:rPr>
+                <a:t>filteredTasks</a:t>
+              </a:r>
+              <a:r>
+                <a:rPr lang="en-US" sz="1400" dirty="0">
+                  <a:solidFill>
+                    <a:schemeClr val="bg1"/>
+                  </a:solidFill>
+                </a:rPr>
+                <a:t>: </a:t>
+              </a:r>
+              <a:r>
+                <a:rPr lang="en-US" sz="1400" dirty="0" err="1">
+                  <a:solidFill>
+                    <a:schemeClr val="bg1"/>
+                  </a:solidFill>
+                </a:rPr>
+                <a:t>FilteredList</a:t>
+              </a:r>
+              <a:r>
+                <a:rPr lang="en-US" sz="1400" dirty="0">
+                  <a:solidFill>
+                    <a:schemeClr val="bg1"/>
+                  </a:solidFill>
+                </a:rPr>
+                <a:t>&lt;Task&gt;</a:t>
+              </a:r>
+              <a:endParaRPr lang="en-SG" sz="1400" dirty="0">
                 <a:solidFill>
                   <a:schemeClr val="bg1"/>
                 </a:solidFill>
-              </a:rPr>
-              <a:t>model: Model</a:t>
-            </a:r>
-            <a:endParaRPr lang="en-SG" sz="1400" dirty="0">
-              <a:solidFill>
-                <a:schemeClr val="bg1"/>
-              </a:solidFill>
-            </a:endParaRPr>
-          </a:p>
-        </p:txBody>
-      </p:sp>
-      <p:cxnSp>
-        <p:nvCxnSpPr>
-          <p:cNvPr id="46" name="Straight Connector 45"/>
-          <p:cNvCxnSpPr>
-            <a:cxnSpLocks/>
-          </p:cNvCxnSpPr>
-          <p:nvPr/>
-        </p:nvCxnSpPr>
-        <p:spPr>
-          <a:xfrm flipH="1">
-            <a:off x="3529532" y="2683014"/>
-            <a:ext cx="3959" cy="1735710"/>
-          </a:xfrm>
-          <a:prstGeom prst="line">
-            <a:avLst/>
-          </a:prstGeom>
-          <a:ln w="19050">
-            <a:solidFill>
-              <a:srgbClr val="7030A0"/>
-            </a:solidFill>
-            <a:prstDash val="sysDash"/>
-          </a:ln>
-          <a:effectLst/>
-        </p:spPr>
-        <p:style>
-          <a:lnRef idx="1">
-            <a:schemeClr val="accent1"/>
-          </a:lnRef>
-          <a:fillRef idx="2">
-            <a:schemeClr val="accent1"/>
-          </a:fillRef>
-          <a:effectRef idx="1">
-            <a:schemeClr val="accent1"/>
-          </a:effectRef>
-          <a:fontRef idx="minor">
-            <a:schemeClr val="dk1"/>
-          </a:fontRef>
-        </p:style>
-      </p:cxnSp>
-      <p:sp>
-        <p:nvSpPr>
-          <p:cNvPr id="49" name="Rectangle 48"/>
-          <p:cNvSpPr/>
-          <p:nvPr/>
-        </p:nvSpPr>
-        <p:spPr>
-          <a:xfrm>
-            <a:off x="3430568" y="2987814"/>
-            <a:ext cx="168896" cy="775693"/>
-          </a:xfrm>
-          <a:prstGeom prst="rect">
-            <a:avLst/>
-          </a:prstGeom>
-          <a:solidFill>
-            <a:srgbClr val="7030A0"/>
-          </a:solidFill>
-          <a:ln>
-            <a:solidFill>
-              <a:srgbClr val="7030A0"/>
-            </a:solidFill>
-          </a:ln>
-          <a:effectLst/>
-        </p:spPr>
-        <p:style>
-          <a:lnRef idx="1">
-            <a:schemeClr val="accent3"/>
-          </a:lnRef>
-          <a:fillRef idx="2">
-            <a:schemeClr val="accent3"/>
-          </a:fillRef>
-          <a:effectRef idx="1">
-            <a:schemeClr val="accent3"/>
-          </a:effectRef>
-          <a:fontRef idx="minor">
-            <a:schemeClr val="dk1"/>
-          </a:fontRef>
-        </p:style>
-        <p:txBody>
-          <a:bodyPr rtlCol="0" anchor="ctr"/>
-          <a:lstStyle/>
-          <a:p>
-            <a:pPr algn="ctr"/>
-            <a:endParaRPr lang="en-SG" sz="1400"/>
-          </a:p>
-        </p:txBody>
-      </p:sp>
-      <p:cxnSp>
-        <p:nvCxnSpPr>
-          <p:cNvPr id="50" name="Straight Arrow Connector 49"/>
-          <p:cNvCxnSpPr>
-            <a:cxnSpLocks/>
-          </p:cNvCxnSpPr>
-          <p:nvPr/>
-        </p:nvCxnSpPr>
-        <p:spPr>
-          <a:xfrm>
-            <a:off x="1395250" y="3010970"/>
-            <a:ext cx="2035318" cy="0"/>
-          </a:xfrm>
-          <a:prstGeom prst="straightConnector1">
-            <a:avLst/>
-          </a:prstGeom>
-          <a:ln w="19050">
-            <a:solidFill>
-              <a:srgbClr val="0070C0"/>
-            </a:solidFill>
-            <a:tailEnd type="arrow"/>
-          </a:ln>
-        </p:spPr>
-        <p:style>
-          <a:lnRef idx="1">
-            <a:schemeClr val="accent1"/>
-          </a:lnRef>
-          <a:fillRef idx="0">
-            <a:schemeClr val="accent1"/>
-          </a:fillRef>
-          <a:effectRef idx="0">
-            <a:schemeClr val="accent1"/>
-          </a:effectRef>
-          <a:fontRef idx="minor">
-            <a:schemeClr val="tx1"/>
-          </a:fontRef>
-        </p:style>
-      </p:cxnSp>
-      <p:cxnSp>
-        <p:nvCxnSpPr>
-          <p:cNvPr id="89" name="Straight Connector 88">
-            <a:extLst>
-              <a:ext uri="{FF2B5EF4-FFF2-40B4-BE49-F238E27FC236}">
-                <a16:creationId xmlns:a16="http://schemas.microsoft.com/office/drawing/2014/main" id="{E4E1C8CA-49DF-45D8-80A5-D5C8282EE927}"/>
-              </a:ext>
-            </a:extLst>
-          </p:cNvPr>
-          <p:cNvCxnSpPr>
-            <a:cxnSpLocks/>
-          </p:cNvCxnSpPr>
-          <p:nvPr/>
-        </p:nvCxnSpPr>
-        <p:spPr>
-          <a:xfrm>
-            <a:off x="5397418" y="2884360"/>
-            <a:ext cx="17996" cy="1467648"/>
-          </a:xfrm>
-          <a:prstGeom prst="line">
-            <a:avLst/>
-          </a:prstGeom>
-          <a:ln w="19050">
-            <a:solidFill>
-              <a:srgbClr val="7030A0"/>
-            </a:solidFill>
-            <a:prstDash val="sysDash"/>
-          </a:ln>
-          <a:effectLst/>
-        </p:spPr>
-        <p:style>
-          <a:lnRef idx="1">
-            <a:schemeClr val="accent1"/>
-          </a:lnRef>
-          <a:fillRef idx="2">
-            <a:schemeClr val="accent1"/>
-          </a:fillRef>
-          <a:effectRef idx="1">
-            <a:schemeClr val="accent1"/>
-          </a:effectRef>
-          <a:fontRef idx="minor">
-            <a:schemeClr val="dk1"/>
-          </a:fontRef>
-        </p:style>
-      </p:cxnSp>
-      <p:cxnSp>
-        <p:nvCxnSpPr>
-          <p:cNvPr id="52" name="Straight Arrow Connector 51"/>
-          <p:cNvCxnSpPr>
-            <a:cxnSpLocks/>
-          </p:cNvCxnSpPr>
-          <p:nvPr/>
-        </p:nvCxnSpPr>
-        <p:spPr>
-          <a:xfrm flipV="1">
-            <a:off x="3587032" y="3210068"/>
-            <a:ext cx="1732540" cy="2479"/>
-          </a:xfrm>
-          <a:prstGeom prst="straightConnector1">
-            <a:avLst/>
-          </a:prstGeom>
-          <a:ln w="19050">
-            <a:solidFill>
-              <a:srgbClr val="7030A0"/>
-            </a:solidFill>
-            <a:tailEnd type="arrow"/>
-          </a:ln>
-        </p:spPr>
-        <p:style>
-          <a:lnRef idx="1">
-            <a:schemeClr val="accent1"/>
-          </a:lnRef>
-          <a:fillRef idx="0">
-            <a:schemeClr val="accent1"/>
-          </a:fillRef>
-          <a:effectRef idx="0">
-            <a:schemeClr val="accent1"/>
-          </a:effectRef>
-          <a:fontRef idx="minor">
-            <a:schemeClr val="tx1"/>
-          </a:fontRef>
-        </p:style>
-      </p:cxnSp>
-      <p:cxnSp>
-        <p:nvCxnSpPr>
-          <p:cNvPr id="60" name="Straight Arrow Connector 59">
-            <a:extLst>
-              <a:ext uri="{FF2B5EF4-FFF2-40B4-BE49-F238E27FC236}">
-                <a16:creationId xmlns:a16="http://schemas.microsoft.com/office/drawing/2014/main" id="{7C9F21BC-13A9-471F-825A-2621FD36355F}"/>
-              </a:ext>
-            </a:extLst>
-          </p:cNvPr>
-          <p:cNvCxnSpPr>
-            <a:cxnSpLocks/>
-            <a:endCxn id="86" idx="2"/>
-          </p:cNvCxnSpPr>
-          <p:nvPr/>
-        </p:nvCxnSpPr>
-        <p:spPr>
-          <a:xfrm>
-            <a:off x="3587032" y="3569843"/>
-            <a:ext cx="1800156" cy="20802"/>
-          </a:xfrm>
-          <a:prstGeom prst="straightConnector1">
-            <a:avLst/>
-          </a:prstGeom>
-          <a:ln w="19050">
-            <a:solidFill>
-              <a:srgbClr val="7030A0"/>
-            </a:solidFill>
-            <a:prstDash val="sysDash"/>
-            <a:headEnd type="arrow" w="med" len="med"/>
-            <a:tailEnd type="none" w="med" len="med"/>
-          </a:ln>
-        </p:spPr>
-        <p:style>
-          <a:lnRef idx="1">
-            <a:schemeClr val="accent1"/>
-          </a:lnRef>
-          <a:fillRef idx="0">
-            <a:schemeClr val="accent1"/>
-          </a:fillRef>
-          <a:effectRef idx="0">
-            <a:schemeClr val="accent1"/>
-          </a:effectRef>
-          <a:fontRef idx="minor">
-            <a:schemeClr val="tx1"/>
-          </a:fontRef>
-        </p:style>
-      </p:cxnSp>
-      <p:cxnSp>
-        <p:nvCxnSpPr>
-          <p:cNvPr id="63" name="Straight Arrow Connector 62">
-            <a:extLst>
-              <a:ext uri="{FF2B5EF4-FFF2-40B4-BE49-F238E27FC236}">
-                <a16:creationId xmlns:a16="http://schemas.microsoft.com/office/drawing/2014/main" id="{7C9F21BC-13A9-471F-825A-2621FD36355F}"/>
-              </a:ext>
-            </a:extLst>
-          </p:cNvPr>
-          <p:cNvCxnSpPr>
-            <a:cxnSpLocks/>
-          </p:cNvCxnSpPr>
-          <p:nvPr/>
-        </p:nvCxnSpPr>
-        <p:spPr>
-          <a:xfrm>
-            <a:off x="1395250" y="3763507"/>
-            <a:ext cx="2035318" cy="0"/>
-          </a:xfrm>
-          <a:prstGeom prst="straightConnector1">
-            <a:avLst/>
-          </a:prstGeom>
-          <a:ln w="19050">
-            <a:solidFill>
-              <a:srgbClr val="7030A0"/>
-            </a:solidFill>
-            <a:prstDash val="sysDash"/>
-            <a:headEnd type="arrow" w="med" len="med"/>
-            <a:tailEnd type="none" w="med" len="med"/>
-          </a:ln>
-        </p:spPr>
-        <p:style>
-          <a:lnRef idx="1">
-            <a:schemeClr val="accent1"/>
-          </a:lnRef>
-          <a:fillRef idx="0">
-            <a:schemeClr val="accent1"/>
-          </a:fillRef>
-          <a:effectRef idx="0">
-            <a:schemeClr val="accent1"/>
-          </a:effectRef>
-          <a:fontRef idx="minor">
-            <a:schemeClr val="tx1"/>
-          </a:fontRef>
-        </p:style>
-      </p:cxnSp>
-      <p:sp>
-        <p:nvSpPr>
-          <p:cNvPr id="3" name="TextBox 2">
-            <a:extLst>
-              <a:ext uri="{FF2B5EF4-FFF2-40B4-BE49-F238E27FC236}">
-                <a16:creationId xmlns:a16="http://schemas.microsoft.com/office/drawing/2014/main" id="{20737034-585F-42BE-8F8B-C63C7F9947AB}"/>
-              </a:ext>
-            </a:extLst>
-          </p:cNvPr>
-          <p:cNvSpPr txBox="1"/>
-          <p:nvPr/>
-        </p:nvSpPr>
-        <p:spPr>
-          <a:xfrm>
-            <a:off x="679490" y="3180639"/>
-            <a:ext cx="1430932" cy="307777"/>
-          </a:xfrm>
-          <a:prstGeom prst="rect">
-            <a:avLst/>
-          </a:prstGeom>
-          <a:noFill/>
-        </p:spPr>
-        <p:txBody>
-          <a:bodyPr wrap="square" rtlCol="0">
-            <a:spAutoFit/>
-          </a:bodyPr>
-          <a:lstStyle/>
-          <a:p>
-            <a:r>
-              <a:rPr lang="en-SG" sz="1400" dirty="0"/>
-              <a:t>From (1) or (2)</a:t>
-            </a:r>
-          </a:p>
-        </p:txBody>
-      </p:sp>
-      <p:sp>
-        <p:nvSpPr>
-          <p:cNvPr id="44" name="TextBox 43">
-            <a:extLst>
-              <a:ext uri="{FF2B5EF4-FFF2-40B4-BE49-F238E27FC236}">
-                <a16:creationId xmlns:a16="http://schemas.microsoft.com/office/drawing/2014/main" id="{4ED6EC67-E3C8-4579-BC04-6CF8E451E6E9}"/>
-              </a:ext>
-            </a:extLst>
-          </p:cNvPr>
-          <p:cNvSpPr txBox="1"/>
-          <p:nvPr/>
-        </p:nvSpPr>
-        <p:spPr>
-          <a:xfrm>
-            <a:off x="1395250" y="2828453"/>
-            <a:ext cx="1996232" cy="169277"/>
-          </a:xfrm>
-          <a:prstGeom prst="rect">
-            <a:avLst/>
-          </a:prstGeom>
-          <a:noFill/>
-        </p:spPr>
-        <p:txBody>
-          <a:bodyPr wrap="square" lIns="0" tIns="0" rIns="0" bIns="0" rtlCol="0">
-            <a:spAutoFit/>
-          </a:bodyPr>
-          <a:lstStyle>
-            <a:defPPr>
-              <a:defRPr lang="en-US"/>
-            </a:defPPr>
-            <a:lvl1pPr algn="r">
-              <a:defRPr sz="1400">
+              </a:endParaRPr>
+            </a:p>
+          </p:txBody>
+        </p:sp>
+        <p:sp>
+          <p:nvSpPr>
+            <p:cNvPr id="53" name="TextBox 52">
+              <a:extLst>
+                <a:ext uri="{FF2B5EF4-FFF2-40B4-BE49-F238E27FC236}">
+                  <a16:creationId xmlns:a16="http://schemas.microsoft.com/office/drawing/2014/main" id="{B5BE6A0B-D0ED-47A4-8962-372629854968}"/>
+                </a:ext>
+              </a:extLst>
+            </p:cNvPr>
+            <p:cNvSpPr txBox="1"/>
+            <p:nvPr/>
+          </p:nvSpPr>
+          <p:spPr>
+            <a:xfrm>
+              <a:off x="3653005" y="3021979"/>
+              <a:ext cx="1559485" cy="184666"/>
+            </a:xfrm>
+            <a:prstGeom prst="rect">
+              <a:avLst/>
+            </a:prstGeom>
+            <a:noFill/>
+            <a:ln>
+              <a:noFill/>
+            </a:ln>
+          </p:spPr>
+          <p:txBody>
+            <a:bodyPr wrap="square" lIns="0" tIns="0" rIns="0" bIns="0" rtlCol="0">
+              <a:spAutoFit/>
+            </a:bodyPr>
+            <a:lstStyle>
+              <a:defPPr>
+                <a:defRPr lang="en-US"/>
+              </a:defPPr>
+              <a:lvl1pPr algn="r">
+                <a:defRPr sz="1400">
+                  <a:solidFill>
+                    <a:srgbClr val="0070C0"/>
+                  </a:solidFill>
+                </a:defRPr>
+              </a:lvl1pPr>
+            </a:lstStyle>
+            <a:p>
+              <a:r>
+                <a:rPr lang="en-US" sz="1200" dirty="0" err="1">
+                  <a:solidFill>
+                    <a:srgbClr val="7030A0"/>
+                  </a:solidFill>
+                </a:rPr>
+                <a:t>setPredicate</a:t>
+              </a:r>
+              <a:r>
+                <a:rPr lang="en-US" sz="1200" dirty="0">
+                  <a:solidFill>
+                    <a:srgbClr val="7030A0"/>
+                  </a:solidFill>
+                </a:rPr>
+                <a:t>(predicate)</a:t>
+              </a:r>
+              <a:endParaRPr lang="en-US" sz="1200" dirty="0">
                 <a:solidFill>
-                  <a:srgbClr val="0070C0"/>
+                  <a:schemeClr val="accent4">
+                    <a:lumMod val="75000"/>
+                  </a:schemeClr>
                 </a:solidFill>
-              </a:defRPr>
-            </a:lvl1pPr>
-          </a:lstStyle>
-          <a:p>
-            <a:r>
-              <a:rPr lang="en-US" sz="1100" dirty="0" err="1"/>
-              <a:t>updateFilteredTaskList</a:t>
-            </a:r>
-            <a:r>
-              <a:rPr lang="en-US" sz="1100" dirty="0"/>
-              <a:t>(predicate)</a:t>
-            </a:r>
-          </a:p>
-        </p:txBody>
-      </p:sp>
-      <p:sp>
-        <p:nvSpPr>
-          <p:cNvPr id="51" name="Rectangle 62">
-            <a:extLst>
-              <a:ext uri="{FF2B5EF4-FFF2-40B4-BE49-F238E27FC236}">
-                <a16:creationId xmlns:a16="http://schemas.microsoft.com/office/drawing/2014/main" id="{D2E92B75-FB28-4890-A92D-C5555A186336}"/>
-              </a:ext>
-            </a:extLst>
-          </p:cNvPr>
-          <p:cNvSpPr/>
-          <p:nvPr/>
-        </p:nvSpPr>
-        <p:spPr>
-          <a:xfrm>
-            <a:off x="4555117" y="2452324"/>
-            <a:ext cx="1559485" cy="435456"/>
-          </a:xfrm>
-          <a:prstGeom prst="rect">
-            <a:avLst/>
-          </a:prstGeom>
-          <a:solidFill>
-            <a:srgbClr val="7030A0"/>
-          </a:solidFill>
-          <a:ln w="19050">
-            <a:solidFill>
-              <a:srgbClr val="7030A0"/>
-            </a:solidFill>
-          </a:ln>
-          <a:effectLst/>
-        </p:spPr>
-        <p:style>
-          <a:lnRef idx="1">
-            <a:schemeClr val="accent2"/>
-          </a:lnRef>
-          <a:fillRef idx="2">
-            <a:schemeClr val="accent2"/>
-          </a:fillRef>
-          <a:effectRef idx="1">
-            <a:schemeClr val="accent2"/>
-          </a:effectRef>
-          <a:fontRef idx="minor">
-            <a:schemeClr val="dk1"/>
-          </a:fontRef>
-        </p:style>
-        <p:txBody>
-          <a:bodyPr rtlCol="0" anchor="ctr"/>
-          <a:lstStyle/>
-          <a:p>
-            <a:pPr algn="ctr"/>
-            <a:r>
-              <a:rPr lang="en-US" sz="1400" dirty="0" err="1">
-                <a:solidFill>
-                  <a:schemeClr val="bg1"/>
-                </a:solidFill>
-              </a:rPr>
-              <a:t>filteredTasks</a:t>
-            </a:r>
-            <a:r>
-              <a:rPr lang="en-US" sz="1400" dirty="0">
-                <a:solidFill>
-                  <a:schemeClr val="bg1"/>
-                </a:solidFill>
-              </a:rPr>
-              <a:t>: </a:t>
-            </a:r>
-            <a:r>
-              <a:rPr lang="en-US" sz="1400" dirty="0" err="1">
-                <a:solidFill>
-                  <a:schemeClr val="bg1"/>
-                </a:solidFill>
-              </a:rPr>
-              <a:t>FilteredList</a:t>
-            </a:r>
-            <a:r>
-              <a:rPr lang="en-US" sz="1400" dirty="0">
-                <a:solidFill>
-                  <a:schemeClr val="bg1"/>
-                </a:solidFill>
-              </a:rPr>
-              <a:t>&lt;Task&gt;</a:t>
-            </a:r>
-            <a:endParaRPr lang="en-SG" sz="1400" dirty="0">
-              <a:solidFill>
-                <a:schemeClr val="bg1"/>
-              </a:solidFill>
-            </a:endParaRPr>
-          </a:p>
-        </p:txBody>
-      </p:sp>
-      <p:sp>
-        <p:nvSpPr>
-          <p:cNvPr id="53" name="TextBox 52">
-            <a:extLst>
-              <a:ext uri="{FF2B5EF4-FFF2-40B4-BE49-F238E27FC236}">
-                <a16:creationId xmlns:a16="http://schemas.microsoft.com/office/drawing/2014/main" id="{B5BE6A0B-D0ED-47A4-8962-372629854968}"/>
-              </a:ext>
-            </a:extLst>
-          </p:cNvPr>
-          <p:cNvSpPr txBox="1"/>
-          <p:nvPr/>
-        </p:nvSpPr>
-        <p:spPr>
-          <a:xfrm>
-            <a:off x="3653005" y="3021979"/>
-            <a:ext cx="1559485" cy="184666"/>
-          </a:xfrm>
-          <a:prstGeom prst="rect">
-            <a:avLst/>
-          </a:prstGeom>
-          <a:noFill/>
-          <a:ln>
-            <a:noFill/>
-          </a:ln>
-        </p:spPr>
-        <p:txBody>
-          <a:bodyPr wrap="square" lIns="0" tIns="0" rIns="0" bIns="0" rtlCol="0">
-            <a:spAutoFit/>
-          </a:bodyPr>
-          <a:lstStyle>
-            <a:defPPr>
-              <a:defRPr lang="en-US"/>
-            </a:defPPr>
-            <a:lvl1pPr algn="r">
-              <a:defRPr sz="1400">
-                <a:solidFill>
-                  <a:srgbClr val="0070C0"/>
-                </a:solidFill>
-              </a:defRPr>
-            </a:lvl1pPr>
-          </a:lstStyle>
-          <a:p>
-            <a:r>
-              <a:rPr lang="en-US" sz="1200" dirty="0" err="1">
-                <a:solidFill>
-                  <a:srgbClr val="7030A0"/>
-                </a:solidFill>
-              </a:rPr>
-              <a:t>setPredicate</a:t>
-            </a:r>
-            <a:r>
-              <a:rPr lang="en-US" sz="1200" dirty="0">
-                <a:solidFill>
-                  <a:srgbClr val="7030A0"/>
-                </a:solidFill>
-              </a:rPr>
-              <a:t>(predicate)</a:t>
-            </a:r>
-            <a:endParaRPr lang="en-US" sz="1200" dirty="0">
-              <a:solidFill>
-                <a:schemeClr val="accent4">
-                  <a:lumMod val="75000"/>
-                </a:schemeClr>
-              </a:solidFill>
-            </a:endParaRPr>
-          </a:p>
-        </p:txBody>
-      </p:sp>
-      <p:sp>
-        <p:nvSpPr>
-          <p:cNvPr id="14" name="Rectangle 13">
-            <a:extLst>
-              <a:ext uri="{FF2B5EF4-FFF2-40B4-BE49-F238E27FC236}">
-                <a16:creationId xmlns:a16="http://schemas.microsoft.com/office/drawing/2014/main" id="{8898D108-FFFB-40B1-870B-739C245ECC82}"/>
-              </a:ext>
-            </a:extLst>
-          </p:cNvPr>
-          <p:cNvSpPr/>
-          <p:nvPr/>
-        </p:nvSpPr>
-        <p:spPr>
-          <a:xfrm>
-            <a:off x="5259940" y="1547739"/>
-            <a:ext cx="1206099" cy="369332"/>
-          </a:xfrm>
-          <a:prstGeom prst="rect">
-            <a:avLst/>
-          </a:prstGeom>
-        </p:spPr>
-        <p:txBody>
-          <a:bodyPr wrap="none">
-            <a:spAutoFit/>
-          </a:bodyPr>
-          <a:lstStyle/>
-          <a:p>
-            <a:r>
-              <a:rPr lang="en-SG" dirty="0"/>
-              <a:t>(</a:t>
-            </a:r>
-            <a:r>
-              <a:rPr lang="en-SG" dirty="0" err="1"/>
-              <a:t>TaskFilter</a:t>
-            </a:r>
-            <a:r>
-              <a:rPr lang="en-SG" dirty="0"/>
-              <a:t>)</a:t>
-            </a:r>
-          </a:p>
-        </p:txBody>
-      </p:sp>
+              </a:endParaRPr>
+            </a:p>
+          </p:txBody>
+        </p:sp>
+      </p:grpSp>
     </p:spTree>
     <p:extLst>
       <p:ext uri="{BB962C8B-B14F-4D97-AF65-F5344CB8AC3E}">

</xml_diff>

<commit_message>
Add lifelines to command result
</commit_message>
<xml_diff>
--- a/docs/diagrams/TaskListFindSequenceDiagram.pptx
+++ b/docs/diagrams/TaskListFindSequenceDiagram.pptx
@@ -6128,6 +6128,51 @@
           </a:p>
         </p:txBody>
       </p:sp>
+      <p:cxnSp>
+        <p:nvCxnSpPr>
+          <p:cNvPr id="52" name="Straight Connector 51">
+            <a:extLst>
+              <a:ext uri="{FF2B5EF4-FFF2-40B4-BE49-F238E27FC236}">
+                <a16:creationId xmlns:a16="http://schemas.microsoft.com/office/drawing/2014/main" id="{5E03F70C-0EB6-4ECE-9ADB-26FC7D040D33}"/>
+              </a:ext>
+            </a:extLst>
+          </p:cNvPr>
+          <p:cNvCxnSpPr>
+            <a:cxnSpLocks/>
+          </p:cNvCxnSpPr>
+          <p:nvPr/>
+        </p:nvCxnSpPr>
+        <p:spPr>
+          <a:xfrm flipH="1">
+            <a:off x="8077200" y="5534171"/>
+            <a:ext cx="4512" cy="1030836"/>
+          </a:xfrm>
+          <a:prstGeom prst="line">
+            <a:avLst/>
+          </a:prstGeom>
+          <a:ln w="19050">
+            <a:solidFill>
+              <a:srgbClr val="0070C0"/>
+            </a:solidFill>
+            <a:prstDash val="sysDash"/>
+          </a:ln>
+          <a:effectLst/>
+        </p:spPr>
+        <p:style>
+          <a:lnRef idx="1">
+            <a:schemeClr val="accent1"/>
+          </a:lnRef>
+          <a:fillRef idx="2">
+            <a:schemeClr val="accent1"/>
+          </a:fillRef>
+          <a:effectRef idx="1">
+            <a:schemeClr val="accent1"/>
+          </a:effectRef>
+          <a:fontRef idx="minor">
+            <a:schemeClr val="dk1"/>
+          </a:fontRef>
+        </p:style>
+      </p:cxnSp>
     </p:spTree>
     <p:extLst>
       <p:ext uri="{BB962C8B-B14F-4D97-AF65-F5344CB8AC3E}">
@@ -9205,6 +9250,51 @@
           </p:txBody>
         </p:sp>
       </p:grpSp>
+      <p:cxnSp>
+        <p:nvCxnSpPr>
+          <p:cNvPr id="63" name="Straight Connector 62">
+            <a:extLst>
+              <a:ext uri="{FF2B5EF4-FFF2-40B4-BE49-F238E27FC236}">
+                <a16:creationId xmlns:a16="http://schemas.microsoft.com/office/drawing/2014/main" id="{4326FEF0-86A8-4E3D-8348-C13D50D61113}"/>
+              </a:ext>
+            </a:extLst>
+          </p:cNvPr>
+          <p:cNvCxnSpPr>
+            <a:cxnSpLocks/>
+          </p:cNvCxnSpPr>
+          <p:nvPr/>
+        </p:nvCxnSpPr>
+        <p:spPr>
+          <a:xfrm flipH="1">
+            <a:off x="8846012" y="5522364"/>
+            <a:ext cx="4512" cy="1030836"/>
+          </a:xfrm>
+          <a:prstGeom prst="line">
+            <a:avLst/>
+          </a:prstGeom>
+          <a:ln w="19050">
+            <a:solidFill>
+              <a:srgbClr val="0070C0"/>
+            </a:solidFill>
+            <a:prstDash val="sysDash"/>
+          </a:ln>
+          <a:effectLst/>
+        </p:spPr>
+        <p:style>
+          <a:lnRef idx="1">
+            <a:schemeClr val="accent1"/>
+          </a:lnRef>
+          <a:fillRef idx="2">
+            <a:schemeClr val="accent1"/>
+          </a:fillRef>
+          <a:effectRef idx="1">
+            <a:schemeClr val="accent1"/>
+          </a:effectRef>
+          <a:fontRef idx="minor">
+            <a:schemeClr val="dk1"/>
+          </a:fontRef>
+        </p:style>
+      </p:cxnSp>
     </p:spTree>
     <p:extLst>
       <p:ext uri="{BB962C8B-B14F-4D97-AF65-F5344CB8AC3E}">

</xml_diff>

<commit_message>
Add instance names to AppParser and LogicManager
</commit_message>
<xml_diff>
--- a/docs/diagrams/TaskListFindSequenceDiagram.pptx
+++ b/docs/diagrams/TaskListFindSequenceDiagram.pptx
@@ -4049,22 +4049,14 @@
           <a:p>
             <a:pPr algn="ctr"/>
             <a:r>
-              <a:rPr lang="en-US" sz="1400" dirty="0">
+              <a:rPr lang="en-US" sz="1200" dirty="0" err="1">
                 <a:solidFill>
                   <a:schemeClr val="bg1"/>
                 </a:solidFill>
               </a:rPr>
-              <a:t>:</a:t>
-            </a:r>
-            <a:r>
-              <a:rPr lang="en-US" sz="1400" dirty="0" err="1">
-                <a:solidFill>
-                  <a:schemeClr val="bg1"/>
-                </a:solidFill>
-              </a:rPr>
-              <a:t>LogicManager</a:t>
-            </a:r>
-            <a:endParaRPr lang="en-SG" sz="1400" dirty="0">
+              <a:t>logic:LogicManager</a:t>
+            </a:r>
+            <a:endParaRPr lang="en-SG" sz="1200" dirty="0">
               <a:solidFill>
                 <a:schemeClr val="bg1"/>
               </a:solidFill>
@@ -5805,8 +5797,8 @@
         </p:nvSpPr>
         <p:spPr>
           <a:xfrm>
-            <a:off x="3023293" y="1727727"/>
-            <a:ext cx="1219200" cy="467684"/>
+            <a:off x="2853455" y="1715650"/>
+            <a:ext cx="1548705" cy="467684"/>
           </a:xfrm>
           <a:prstGeom prst="rect">
             <a:avLst/>
@@ -5841,22 +5833,14 @@
           <a:p>
             <a:pPr algn="ctr"/>
             <a:r>
-              <a:rPr lang="en-US" sz="1400" dirty="0">
+              <a:rPr lang="en-US" sz="1200" dirty="0" err="1">
                 <a:solidFill>
                   <a:schemeClr val="bg1"/>
                 </a:solidFill>
               </a:rPr>
-              <a:t>:</a:t>
-            </a:r>
-            <a:r>
-              <a:rPr lang="en-US" sz="1400" dirty="0" err="1">
-                <a:solidFill>
-                  <a:schemeClr val="bg1"/>
-                </a:solidFill>
-              </a:rPr>
-              <a:t>AppParser</a:t>
-            </a:r>
-            <a:endParaRPr lang="en-SG" sz="1400" dirty="0">
+              <a:t>appParser:AppParser</a:t>
+            </a:r>
+            <a:endParaRPr lang="en-SG" sz="1200" dirty="0">
               <a:solidFill>
                 <a:schemeClr val="bg1"/>
               </a:solidFill>
@@ -6406,79 +6390,6 @@
           </a:p>
         </p:txBody>
       </p:sp>
-      <p:sp>
-        <p:nvSpPr>
-          <p:cNvPr id="26" name="Rectangle 62">
-            <a:extLst>
-              <a:ext uri="{FF2B5EF4-FFF2-40B4-BE49-F238E27FC236}">
-                <a16:creationId xmlns:a16="http://schemas.microsoft.com/office/drawing/2014/main" id="{3EDBD8B8-FED0-48CF-973D-9EE001EB7E67}"/>
-              </a:ext>
-            </a:extLst>
-          </p:cNvPr>
-          <p:cNvSpPr/>
-          <p:nvPr/>
-        </p:nvSpPr>
-        <p:spPr>
-          <a:xfrm>
-            <a:off x="532884" y="1752600"/>
-            <a:ext cx="1455629" cy="346760"/>
-          </a:xfrm>
-          <a:prstGeom prst="rect">
-            <a:avLst/>
-          </a:prstGeom>
-          <a:solidFill>
-            <a:srgbClr val="0070C0"/>
-          </a:solidFill>
-          <a:ln w="19050">
-            <a:solidFill>
-              <a:srgbClr val="0070C0"/>
-            </a:solidFill>
-          </a:ln>
-          <a:effectLst/>
-        </p:spPr>
-        <p:style>
-          <a:lnRef idx="1">
-            <a:schemeClr val="accent2"/>
-          </a:lnRef>
-          <a:fillRef idx="2">
-            <a:schemeClr val="accent2"/>
-          </a:fillRef>
-          <a:effectRef idx="1">
-            <a:schemeClr val="accent2"/>
-          </a:effectRef>
-          <a:fontRef idx="minor">
-            <a:schemeClr val="dk1"/>
-          </a:fontRef>
-        </p:style>
-        <p:txBody>
-          <a:bodyPr rtlCol="0" anchor="ctr"/>
-          <a:lstStyle/>
-          <a:p>
-            <a:pPr algn="ctr"/>
-            <a:r>
-              <a:rPr lang="en-US" sz="1400" dirty="0">
-                <a:solidFill>
-                  <a:schemeClr val="bg1"/>
-                </a:solidFill>
-              </a:rPr>
-              <a:t>:</a:t>
-            </a:r>
-            <a:r>
-              <a:rPr lang="en-US" sz="1400" dirty="0" err="1">
-                <a:solidFill>
-                  <a:schemeClr val="bg1"/>
-                </a:solidFill>
-              </a:rPr>
-              <a:t>LogicManager</a:t>
-            </a:r>
-            <a:endParaRPr lang="en-SG" sz="1400" dirty="0">
-              <a:solidFill>
-                <a:schemeClr val="bg1"/>
-              </a:solidFill>
-            </a:endParaRPr>
-          </a:p>
-        </p:txBody>
-      </p:sp>
       <p:cxnSp>
         <p:nvCxnSpPr>
           <p:cNvPr id="27" name="Straight Connector 26">
@@ -6490,7 +6401,6 @@
           </p:cNvPr>
           <p:cNvCxnSpPr>
             <a:cxnSpLocks/>
-            <a:stCxn id="26" idx="2"/>
           </p:cNvCxnSpPr>
           <p:nvPr/>
         </p:nvCxnSpPr>
@@ -8106,79 +8016,6 @@
           </a:fontRef>
         </p:style>
       </p:cxnSp>
-      <p:sp>
-        <p:nvSpPr>
-          <p:cNvPr id="97" name="Rectangle 62">
-            <a:extLst>
-              <a:ext uri="{FF2B5EF4-FFF2-40B4-BE49-F238E27FC236}">
-                <a16:creationId xmlns:a16="http://schemas.microsoft.com/office/drawing/2014/main" id="{14D135E4-31ED-4E6D-9979-049B20BA1908}"/>
-              </a:ext>
-            </a:extLst>
-          </p:cNvPr>
-          <p:cNvSpPr/>
-          <p:nvPr/>
-        </p:nvSpPr>
-        <p:spPr>
-          <a:xfrm>
-            <a:off x="2489377" y="1727727"/>
-            <a:ext cx="1219200" cy="467684"/>
-          </a:xfrm>
-          <a:prstGeom prst="rect">
-            <a:avLst/>
-          </a:prstGeom>
-          <a:solidFill>
-            <a:srgbClr val="0070C0"/>
-          </a:solidFill>
-          <a:ln w="19050">
-            <a:solidFill>
-              <a:srgbClr val="0070C0"/>
-            </a:solidFill>
-          </a:ln>
-          <a:effectLst/>
-        </p:spPr>
-        <p:style>
-          <a:lnRef idx="1">
-            <a:schemeClr val="accent2"/>
-          </a:lnRef>
-          <a:fillRef idx="2">
-            <a:schemeClr val="accent2"/>
-          </a:fillRef>
-          <a:effectRef idx="1">
-            <a:schemeClr val="accent2"/>
-          </a:effectRef>
-          <a:fontRef idx="minor">
-            <a:schemeClr val="dk1"/>
-          </a:fontRef>
-        </p:style>
-        <p:txBody>
-          <a:bodyPr rtlCol="0" anchor="ctr"/>
-          <a:lstStyle/>
-          <a:p>
-            <a:pPr algn="ctr"/>
-            <a:r>
-              <a:rPr lang="en-US" sz="1400" dirty="0">
-                <a:solidFill>
-                  <a:schemeClr val="bg1"/>
-                </a:solidFill>
-              </a:rPr>
-              <a:t>:</a:t>
-            </a:r>
-            <a:r>
-              <a:rPr lang="en-US" sz="1400" dirty="0" err="1">
-                <a:solidFill>
-                  <a:schemeClr val="bg1"/>
-                </a:solidFill>
-              </a:rPr>
-              <a:t>AppParser</a:t>
-            </a:r>
-            <a:endParaRPr lang="en-SG" sz="1400" dirty="0">
-              <a:solidFill>
-                <a:schemeClr val="bg1"/>
-              </a:solidFill>
-            </a:endParaRPr>
-          </a:p>
-        </p:txBody>
-      </p:sp>
       <p:cxnSp>
         <p:nvCxnSpPr>
           <p:cNvPr id="98" name="Straight Arrow Connector 97">
@@ -9295,6 +9132,136 @@
           </a:fontRef>
         </p:style>
       </p:cxnSp>
+      <p:sp>
+        <p:nvSpPr>
+          <p:cNvPr id="68" name="Rectangle 62">
+            <a:extLst>
+              <a:ext uri="{FF2B5EF4-FFF2-40B4-BE49-F238E27FC236}">
+                <a16:creationId xmlns:a16="http://schemas.microsoft.com/office/drawing/2014/main" id="{C04B7F78-C9F8-44E4-A210-DCB6A00F21E9}"/>
+              </a:ext>
+            </a:extLst>
+          </p:cNvPr>
+          <p:cNvSpPr/>
+          <p:nvPr/>
+        </p:nvSpPr>
+        <p:spPr>
+          <a:xfrm>
+            <a:off x="563622" y="1749976"/>
+            <a:ext cx="1455629" cy="346760"/>
+          </a:xfrm>
+          <a:prstGeom prst="rect">
+            <a:avLst/>
+          </a:prstGeom>
+          <a:solidFill>
+            <a:srgbClr val="0070C0"/>
+          </a:solidFill>
+          <a:ln w="19050">
+            <a:solidFill>
+              <a:srgbClr val="0070C0"/>
+            </a:solidFill>
+          </a:ln>
+          <a:effectLst/>
+        </p:spPr>
+        <p:style>
+          <a:lnRef idx="1">
+            <a:schemeClr val="accent2"/>
+          </a:lnRef>
+          <a:fillRef idx="2">
+            <a:schemeClr val="accent2"/>
+          </a:fillRef>
+          <a:effectRef idx="1">
+            <a:schemeClr val="accent2"/>
+          </a:effectRef>
+          <a:fontRef idx="minor">
+            <a:schemeClr val="dk1"/>
+          </a:fontRef>
+        </p:style>
+        <p:txBody>
+          <a:bodyPr rtlCol="0" anchor="ctr"/>
+          <a:lstStyle/>
+          <a:p>
+            <a:pPr algn="ctr"/>
+            <a:r>
+              <a:rPr lang="en-US" sz="1200" dirty="0" err="1">
+                <a:solidFill>
+                  <a:schemeClr val="bg1"/>
+                </a:solidFill>
+              </a:rPr>
+              <a:t>logic:LogicManager</a:t>
+            </a:r>
+            <a:endParaRPr lang="en-SG" sz="1200" dirty="0">
+              <a:solidFill>
+                <a:schemeClr val="bg1"/>
+              </a:solidFill>
+            </a:endParaRPr>
+          </a:p>
+        </p:txBody>
+      </p:sp>
+      <p:sp>
+        <p:nvSpPr>
+          <p:cNvPr id="82" name="Rectangle 62">
+            <a:extLst>
+              <a:ext uri="{FF2B5EF4-FFF2-40B4-BE49-F238E27FC236}">
+                <a16:creationId xmlns:a16="http://schemas.microsoft.com/office/drawing/2014/main" id="{F6D0B03B-9402-460C-AEAE-A380E7065BC7}"/>
+              </a:ext>
+            </a:extLst>
+          </p:cNvPr>
+          <p:cNvSpPr/>
+          <p:nvPr/>
+        </p:nvSpPr>
+        <p:spPr>
+          <a:xfrm>
+            <a:off x="2350277" y="1713026"/>
+            <a:ext cx="1548705" cy="467684"/>
+          </a:xfrm>
+          <a:prstGeom prst="rect">
+            <a:avLst/>
+          </a:prstGeom>
+          <a:solidFill>
+            <a:srgbClr val="0070C0"/>
+          </a:solidFill>
+          <a:ln w="19050">
+            <a:solidFill>
+              <a:srgbClr val="0070C0"/>
+            </a:solidFill>
+          </a:ln>
+          <a:effectLst/>
+        </p:spPr>
+        <p:style>
+          <a:lnRef idx="1">
+            <a:schemeClr val="accent2"/>
+          </a:lnRef>
+          <a:fillRef idx="2">
+            <a:schemeClr val="accent2"/>
+          </a:fillRef>
+          <a:effectRef idx="1">
+            <a:schemeClr val="accent2"/>
+          </a:effectRef>
+          <a:fontRef idx="minor">
+            <a:schemeClr val="dk1"/>
+          </a:fontRef>
+        </p:style>
+        <p:txBody>
+          <a:bodyPr rtlCol="0" anchor="ctr"/>
+          <a:lstStyle/>
+          <a:p>
+            <a:pPr algn="ctr"/>
+            <a:r>
+              <a:rPr lang="en-US" sz="1200" dirty="0" err="1">
+                <a:solidFill>
+                  <a:schemeClr val="bg1"/>
+                </a:solidFill>
+              </a:rPr>
+              <a:t>appParser:AppParser</a:t>
+            </a:r>
+            <a:endParaRPr lang="en-SG" sz="1200" dirty="0">
+              <a:solidFill>
+                <a:schemeClr val="bg1"/>
+              </a:solidFill>
+            </a:endParaRPr>
+          </a:p>
+        </p:txBody>
+      </p:sp>
     </p:spTree>
     <p:extLst>
       <p:ext uri="{BB962C8B-B14F-4D97-AF65-F5344CB8AC3E}">

</xml_diff>